<commit_message>
Changes to presentation slides
Continued working on slides -- wondering if we change the coefficient to a lm? Might be easier
</commit_message>
<xml_diff>
--- a/Final.Project_Presentation.Slides_v1.pptx
+++ b/Final.Project_Presentation.Slides_v1.pptx
@@ -5,10 +5,10 @@
     <p:sldMasterId id="2147483666" r:id="rId4"/>
   </p:sldMasterIdLst>
   <p:notesMasterIdLst>
-    <p:notesMasterId r:id="rId19"/>
+    <p:notesMasterId r:id="rId21"/>
   </p:notesMasterIdLst>
   <p:handoutMasterIdLst>
-    <p:handoutMasterId r:id="rId20"/>
+    <p:handoutMasterId r:id="rId22"/>
   </p:handoutMasterIdLst>
   <p:sldIdLst>
     <p:sldId id="256" r:id="rId5"/>
@@ -24,7 +24,9 @@
     <p:sldId id="266" r:id="rId15"/>
     <p:sldId id="267" r:id="rId16"/>
     <p:sldId id="268" r:id="rId17"/>
-    <p:sldId id="269" r:id="rId18"/>
+    <p:sldId id="270" r:id="rId18"/>
+    <p:sldId id="271" r:id="rId19"/>
+    <p:sldId id="272" r:id="rId20"/>
   </p:sldIdLst>
   <p:sldSz cx="12192000" cy="6858000"/>
   <p:notesSz cx="6858000" cy="9144000"/>
@@ -19650,8 +19652,8 @@
         </p:nvSpPr>
         <p:spPr>
           <a:xfrm>
-            <a:off x="1358793" y="4606221"/>
-            <a:ext cx="9474411" cy="923330"/>
+            <a:off x="1358791" y="4216740"/>
+            <a:ext cx="9474411" cy="2031325"/>
           </a:xfrm>
           <a:prstGeom prst="rect">
             <a:avLst/>
@@ -19729,7 +19731,134 @@
             </a:r>
           </a:p>
           <a:p>
-            <a:endParaRPr lang="en-US" dirty="0"/>
+            <a:r>
+              <a:rPr lang="en-US" dirty="0"/>
+              <a:t>...</a:t>
+            </a:r>
+          </a:p>
+          <a:p>
+            <a:r>
+              <a:rPr lang="en-US" b="1" dirty="0" err="1"/>
+              <a:t>overallSentiment</a:t>
+            </a:r>
+            <a:r>
+              <a:rPr lang="en-US" dirty="0"/>
+              <a:t> = positive - negative, </a:t>
+            </a:r>
+          </a:p>
+          <a:p>
+            <a:r>
+              <a:rPr lang="en-US" b="1" dirty="0" err="1"/>
+              <a:t>parent_ID</a:t>
+            </a:r>
+            <a:r>
+              <a:rPr lang="en-US" b="1" dirty="0"/>
+              <a:t> </a:t>
+            </a:r>
+            <a:r>
+              <a:rPr lang="en-US" dirty="0"/>
+              <a:t>= </a:t>
+            </a:r>
+            <a:r>
+              <a:rPr lang="en-US" dirty="0" err="1"/>
+              <a:t>substr</a:t>
+            </a:r>
+            <a:r>
+              <a:rPr lang="en-US" dirty="0"/>
+              <a:t>(</a:t>
+            </a:r>
+            <a:r>
+              <a:rPr lang="en-US" dirty="0" err="1"/>
+              <a:t>comment_id</a:t>
+            </a:r>
+            <a:r>
+              <a:rPr lang="en-US" dirty="0"/>
+              <a:t>, 1, </a:t>
+            </a:r>
+            <a:r>
+              <a:rPr lang="en-US" dirty="0" err="1"/>
+              <a:t>regexpr</a:t>
+            </a:r>
+            <a:r>
+              <a:rPr lang="en-US" dirty="0"/>
+              <a:t>("\\_[^\\_]*$", </a:t>
+            </a:r>
+            <a:r>
+              <a:rPr lang="en-US" dirty="0" err="1"/>
+              <a:t>comment_id</a:t>
+            </a:r>
+            <a:r>
+              <a:rPr lang="en-US" dirty="0"/>
+              <a:t>)-1))</a:t>
+            </a:r>
+          </a:p>
+          <a:p>
+            <a:r>
+              <a:rPr lang="en-US" b="1" dirty="0" err="1"/>
+              <a:t>parentSentiment</a:t>
+            </a:r>
+            <a:r>
+              <a:rPr lang="en-US" dirty="0"/>
+              <a:t> = </a:t>
+            </a:r>
+            <a:r>
+              <a:rPr lang="en-US" dirty="0" err="1"/>
+              <a:t>workingData</a:t>
+            </a:r>
+            <a:r>
+              <a:rPr lang="en-US" dirty="0"/>
+              <a:t>[match(</a:t>
+            </a:r>
+            <a:r>
+              <a:rPr lang="en-US" dirty="0" err="1"/>
+              <a:t>parent_ID</a:t>
+            </a:r>
+            <a:r>
+              <a:rPr lang="en-US" dirty="0"/>
+              <a:t>, </a:t>
+            </a:r>
+            <a:r>
+              <a:rPr lang="en-US" dirty="0" err="1"/>
+              <a:t>workingData$comment_id</a:t>
+            </a:r>
+            <a:r>
+              <a:rPr lang="en-US" dirty="0"/>
+              <a:t>), 14]</a:t>
+            </a:r>
+          </a:p>
+          <a:p>
+            <a:r>
+              <a:rPr lang="en-US" b="1" dirty="0" err="1"/>
+              <a:t>parentPopularity</a:t>
+            </a:r>
+            <a:r>
+              <a:rPr lang="en-US" dirty="0"/>
+              <a:t> = </a:t>
+            </a:r>
+            <a:r>
+              <a:rPr lang="en-US" dirty="0" err="1"/>
+              <a:t>workingData</a:t>
+            </a:r>
+            <a:r>
+              <a:rPr lang="en-US" dirty="0"/>
+              <a:t>[match(</a:t>
+            </a:r>
+            <a:r>
+              <a:rPr lang="en-US" dirty="0" err="1"/>
+              <a:t>parent_ID</a:t>
+            </a:r>
+            <a:r>
+              <a:rPr lang="en-US" dirty="0"/>
+              <a:t>, </a:t>
+            </a:r>
+            <a:r>
+              <a:rPr lang="en-US" dirty="0" err="1"/>
+              <a:t>workingData$comment_id</a:t>
+            </a:r>
+            <a:r>
+              <a:rPr lang="en-US" dirty="0"/>
+              <a:t>), 13]</a:t>
+            </a:r>
           </a:p>
         </p:txBody>
       </p:sp>
@@ -19755,7 +19884,7 @@
         </p:blipFill>
         <p:spPr>
           <a:xfrm>
-            <a:off x="1268695" y="2021132"/>
+            <a:off x="1268691" y="1597590"/>
             <a:ext cx="9654609" cy="2510865"/>
           </a:xfrm>
           <a:prstGeom prst="rect">
@@ -19798,7 +19927,7 @@
           <p:cNvPr id="2" name="Title 1">
             <a:extLst>
               <a:ext uri="{FF2B5EF4-FFF2-40B4-BE49-F238E27FC236}">
-                <a16:creationId xmlns:a16="http://schemas.microsoft.com/office/drawing/2014/main" id="{EE66B678-63BB-2BDB-3E93-6B3734AD78A5}"/>
+                <a16:creationId xmlns:a16="http://schemas.microsoft.com/office/drawing/2014/main" id="{CF29678D-8F81-E56A-F6A0-8C3C4097DE17}"/>
               </a:ext>
             </a:extLst>
           </p:cNvPr>
@@ -19811,8 +19940,8 @@
         </p:nvSpPr>
         <p:spPr>
           <a:xfrm>
-            <a:off x="838200" y="844332"/>
-            <a:ext cx="10515600" cy="508934"/>
+            <a:off x="838200" y="593725"/>
+            <a:ext cx="10515600" cy="658453"/>
           </a:xfrm>
         </p:spPr>
         <p:txBody>
@@ -19821,7 +19950,7 @@
           <a:p>
             <a:r>
               <a:rPr lang="en-US" dirty="0"/>
-              <a:t>Creating Ancillary Variables</a:t>
+              <a:t>Exploring the Comment Data</a:t>
             </a:r>
           </a:p>
         </p:txBody>
@@ -19831,7 +19960,7 @@
           <p:cNvPr id="4" name="Date Placeholder 3">
             <a:extLst>
               <a:ext uri="{FF2B5EF4-FFF2-40B4-BE49-F238E27FC236}">
-                <a16:creationId xmlns:a16="http://schemas.microsoft.com/office/drawing/2014/main" id="{63B14BDE-8CB8-0371-4652-67EE28DDE463}"/>
+                <a16:creationId xmlns:a16="http://schemas.microsoft.com/office/drawing/2014/main" id="{AFA7CBE4-FA82-518B-0A02-7B9E54F62398}"/>
               </a:ext>
             </a:extLst>
           </p:cNvPr>
@@ -19860,7 +19989,7 @@
           <p:cNvPr id="5" name="Footer Placeholder 4">
             <a:extLst>
               <a:ext uri="{FF2B5EF4-FFF2-40B4-BE49-F238E27FC236}">
-                <a16:creationId xmlns:a16="http://schemas.microsoft.com/office/drawing/2014/main" id="{6982885C-DE9E-C90F-CAD5-B33A721BC38E}"/>
+                <a16:creationId xmlns:a16="http://schemas.microsoft.com/office/drawing/2014/main" id="{AB832FC6-77F0-47C2-CFAF-FF79B68F319D}"/>
               </a:ext>
             </a:extLst>
           </p:cNvPr>
@@ -19889,7 +20018,7 @@
           <p:cNvPr id="6" name="Slide Number Placeholder 5">
             <a:extLst>
               <a:ext uri="{FF2B5EF4-FFF2-40B4-BE49-F238E27FC236}">
-                <a16:creationId xmlns:a16="http://schemas.microsoft.com/office/drawing/2014/main" id="{3AB75734-21BC-2185-7B66-B201BA0F8F78}"/>
+                <a16:creationId xmlns:a16="http://schemas.microsoft.com/office/drawing/2014/main" id="{24FDEF54-5C21-2713-7391-EED9F018AA85}"/>
               </a:ext>
             </a:extLst>
           </p:cNvPr>
@@ -19913,12 +20042,72 @@
           </a:p>
         </p:txBody>
       </p:sp>
-      <p:sp>
-        <p:nvSpPr>
-          <p:cNvPr id="9" name="TextBox 8">
-            <a:extLst>
-              <a:ext uri="{FF2B5EF4-FFF2-40B4-BE49-F238E27FC236}">
-                <a16:creationId xmlns:a16="http://schemas.microsoft.com/office/drawing/2014/main" id="{EE03F6D6-6C49-B0F1-40AE-CF7569E7E42A}"/>
+      <p:pic>
+        <p:nvPicPr>
+          <p:cNvPr id="8" name="Picture 7">
+            <a:extLst>
+              <a:ext uri="{FF2B5EF4-FFF2-40B4-BE49-F238E27FC236}">
+                <a16:creationId xmlns:a16="http://schemas.microsoft.com/office/drawing/2014/main" id="{E8D73641-EE0F-6A33-81F4-05843859B026}"/>
+              </a:ext>
+            </a:extLst>
+          </p:cNvPr>
+          <p:cNvPicPr>
+            <a:picLocks noChangeAspect="1"/>
+          </p:cNvPicPr>
+          <p:nvPr/>
+        </p:nvPicPr>
+        <p:blipFill>
+          <a:blip r:embed="rId2"/>
+          <a:stretch>
+            <a:fillRect/>
+          </a:stretch>
+        </p:blipFill>
+        <p:spPr>
+          <a:xfrm>
+            <a:off x="888670" y="1692275"/>
+            <a:ext cx="4928260" cy="4572000"/>
+          </a:xfrm>
+          <a:prstGeom prst="rect">
+            <a:avLst/>
+          </a:prstGeom>
+        </p:spPr>
+      </p:pic>
+      <p:pic>
+        <p:nvPicPr>
+          <p:cNvPr id="9" name="Picture 8">
+            <a:extLst>
+              <a:ext uri="{FF2B5EF4-FFF2-40B4-BE49-F238E27FC236}">
+                <a16:creationId xmlns:a16="http://schemas.microsoft.com/office/drawing/2014/main" id="{A3FD83F6-FD8D-DB57-FCEB-BC8D5604AF35}"/>
+              </a:ext>
+            </a:extLst>
+          </p:cNvPr>
+          <p:cNvPicPr>
+            <a:picLocks noChangeAspect="1"/>
+          </p:cNvPicPr>
+          <p:nvPr/>
+        </p:nvPicPr>
+        <p:blipFill>
+          <a:blip r:embed="rId3"/>
+          <a:stretch>
+            <a:fillRect/>
+          </a:stretch>
+        </p:blipFill>
+        <p:spPr>
+          <a:xfrm>
+            <a:off x="6096000" y="1692275"/>
+            <a:ext cx="4928259" cy="4572000"/>
+          </a:xfrm>
+          <a:prstGeom prst="rect">
+            <a:avLst/>
+          </a:prstGeom>
+        </p:spPr>
+      </p:pic>
+      <p:sp>
+        <p:nvSpPr>
+          <p:cNvPr id="10" name="TextBox 9">
+            <a:extLst>
+              <a:ext uri="{FF2B5EF4-FFF2-40B4-BE49-F238E27FC236}">
+                <a16:creationId xmlns:a16="http://schemas.microsoft.com/office/drawing/2014/main" id="{42405D33-4FC7-D10A-2286-02B9169CCA9D}"/>
               </a:ext>
             </a:extLst>
           </p:cNvPr>
@@ -19927,8 +20116,8 @@
         </p:nvSpPr>
         <p:spPr>
           <a:xfrm>
-            <a:off x="838200" y="4658996"/>
-            <a:ext cx="10515600" cy="1200329"/>
+            <a:off x="1167741" y="1337591"/>
+            <a:ext cx="4507516" cy="369332"/>
           </a:xfrm>
           <a:prstGeom prst="rect">
             <a:avLst/>
@@ -19936,140 +20125,742 @@
           <a:noFill/>
         </p:spPr>
         <p:txBody>
-          <a:bodyPr wrap="square" rtlCol="0">
+          <a:bodyPr wrap="none" rtlCol="0">
             <a:spAutoFit/>
           </a:bodyPr>
           <a:lstStyle/>
           <a:p>
-            <a:r>
-              <a:rPr lang="en-US" b="1" dirty="0" err="1"/>
-              <a:t>overallSentiment</a:t>
-            </a:r>
+            <a:pPr algn="ctr"/>
             <a:r>
               <a:rPr lang="en-US" dirty="0"/>
-              <a:t> = positive - negative, </a:t>
-            </a:r>
-          </a:p>
-          <a:p>
-            <a:r>
-              <a:rPr lang="en-US" b="1" dirty="0" err="1"/>
-              <a:t>parent_ID</a:t>
-            </a:r>
-            <a:r>
-              <a:rPr lang="en-US" b="1" dirty="0"/>
-              <a:t> </a:t>
+              <a:t>Most Common Words in </a:t>
+            </a:r>
+            <a:r>
+              <a:rPr lang="en-US" b="1" dirty="0">
+                <a:solidFill>
+                  <a:schemeClr val="accent6"/>
+                </a:solidFill>
+              </a:rPr>
+              <a:t>Positive</a:t>
             </a:r>
             <a:r>
               <a:rPr lang="en-US" dirty="0"/>
-              <a:t>= </a:t>
-            </a:r>
-            <a:r>
-              <a:rPr lang="en-US" dirty="0" err="1"/>
-              <a:t>substr</a:t>
-            </a:r>
+              <a:t> Comments</a:t>
+            </a:r>
+          </a:p>
+        </p:txBody>
+      </p:sp>
+      <p:sp>
+        <p:nvSpPr>
+          <p:cNvPr id="11" name="TextBox 10">
+            <a:extLst>
+              <a:ext uri="{FF2B5EF4-FFF2-40B4-BE49-F238E27FC236}">
+                <a16:creationId xmlns:a16="http://schemas.microsoft.com/office/drawing/2014/main" id="{E30F7002-590E-B027-FFC5-773CF1987A26}"/>
+              </a:ext>
+            </a:extLst>
+          </p:cNvPr>
+          <p:cNvSpPr txBox="1"/>
+          <p:nvPr/>
+        </p:nvSpPr>
+        <p:spPr>
+          <a:xfrm>
+            <a:off x="6516745" y="1337591"/>
+            <a:ext cx="4628575" cy="369332"/>
+          </a:xfrm>
+          <a:prstGeom prst="rect">
+            <a:avLst/>
+          </a:prstGeom>
+          <a:noFill/>
+        </p:spPr>
+        <p:txBody>
+          <a:bodyPr wrap="none" rtlCol="0">
+            <a:spAutoFit/>
+          </a:bodyPr>
+          <a:lstStyle/>
+          <a:p>
+            <a:pPr algn="ctr"/>
             <a:r>
               <a:rPr lang="en-US" dirty="0"/>
-              <a:t>(</a:t>
-            </a:r>
-            <a:r>
-              <a:rPr lang="en-US" dirty="0" err="1"/>
-              <a:t>comment_id</a:t>
+              <a:t>Most Common Words in </a:t>
+            </a:r>
+            <a:r>
+              <a:rPr lang="en-US" b="1" dirty="0">
+                <a:solidFill>
+                  <a:srgbClr val="C00000"/>
+                </a:solidFill>
+              </a:rPr>
+              <a:t>Negative</a:t>
             </a:r>
             <a:r>
               <a:rPr lang="en-US" dirty="0"/>
-              <a:t>, 1, </a:t>
-            </a:r>
-            <a:r>
-              <a:rPr lang="en-US" dirty="0" err="1"/>
-              <a:t>regexpr</a:t>
-            </a:r>
-            <a:r>
-              <a:rPr lang="en-US" dirty="0"/>
-              <a:t>("\\_[^\\_]*$", </a:t>
-            </a:r>
-            <a:r>
-              <a:rPr lang="en-US" dirty="0" err="1"/>
-              <a:t>comment_id</a:t>
-            </a:r>
-            <a:r>
-              <a:rPr lang="en-US" dirty="0"/>
-              <a:t>)-1))</a:t>
-            </a:r>
-          </a:p>
-          <a:p>
-            <a:r>
-              <a:rPr lang="en-US" b="1" dirty="0" err="1"/>
-              <a:t>parentSentiment</a:t>
-            </a:r>
-            <a:r>
-              <a:rPr lang="en-US" dirty="0"/>
-              <a:t> = </a:t>
-            </a:r>
-            <a:r>
-              <a:rPr lang="en-US" dirty="0" err="1"/>
-              <a:t>workingData</a:t>
-            </a:r>
-            <a:r>
-              <a:rPr lang="en-US" dirty="0"/>
-              <a:t>[match(</a:t>
-            </a:r>
-            <a:r>
-              <a:rPr lang="en-US" dirty="0" err="1"/>
-              <a:t>parent_ID</a:t>
-            </a:r>
-            <a:r>
-              <a:rPr lang="en-US" dirty="0"/>
-              <a:t>, </a:t>
-            </a:r>
-            <a:r>
-              <a:rPr lang="en-US" dirty="0" err="1"/>
-              <a:t>workingData$comment_id</a:t>
-            </a:r>
-            <a:r>
-              <a:rPr lang="en-US" dirty="0"/>
-              <a:t>), 14]</a:t>
-            </a:r>
-          </a:p>
-          <a:p>
-            <a:r>
-              <a:rPr lang="en-US" b="1" dirty="0" err="1"/>
-              <a:t>parentPopularity</a:t>
-            </a:r>
-            <a:r>
-              <a:rPr lang="en-US" dirty="0"/>
-              <a:t> = </a:t>
-            </a:r>
-            <a:r>
-              <a:rPr lang="en-US" dirty="0" err="1"/>
-              <a:t>workingData</a:t>
-            </a:r>
-            <a:r>
-              <a:rPr lang="en-US" dirty="0"/>
-              <a:t>[match(</a:t>
-            </a:r>
-            <a:r>
-              <a:rPr lang="en-US" dirty="0" err="1"/>
-              <a:t>parent_ID</a:t>
-            </a:r>
-            <a:r>
-              <a:rPr lang="en-US" dirty="0"/>
-              <a:t>, </a:t>
-            </a:r>
-            <a:r>
-              <a:rPr lang="en-US" dirty="0" err="1"/>
-              <a:t>workingData$comment_id</a:t>
-            </a:r>
-            <a:r>
-              <a:rPr lang="en-US" dirty="0"/>
-              <a:t>), 13]</a:t>
-            </a:r>
-          </a:p>
-        </p:txBody>
-      </p:sp>
+              <a:t> Comments</a:t>
+            </a:r>
+          </a:p>
+        </p:txBody>
+      </p:sp>
+      <p:cxnSp>
+        <p:nvCxnSpPr>
+          <p:cNvPr id="13" name="Straight Connector 12">
+            <a:extLst>
+              <a:ext uri="{FF2B5EF4-FFF2-40B4-BE49-F238E27FC236}">
+                <a16:creationId xmlns:a16="http://schemas.microsoft.com/office/drawing/2014/main" id="{D27FB056-5782-13D2-213B-9BC2D2D5C656}"/>
+              </a:ext>
+            </a:extLst>
+          </p:cNvPr>
+          <p:cNvCxnSpPr/>
+          <p:nvPr/>
+        </p:nvCxnSpPr>
+        <p:spPr>
+          <a:xfrm>
+            <a:off x="6229851" y="4545511"/>
+            <a:ext cx="91440" cy="0"/>
+          </a:xfrm>
+          <a:prstGeom prst="line">
+            <a:avLst/>
+          </a:prstGeom>
+          <a:ln w="38100">
+            <a:solidFill>
+              <a:srgbClr val="FF0000"/>
+            </a:solidFill>
+          </a:ln>
+        </p:spPr>
+        <p:style>
+          <a:lnRef idx="3">
+            <a:schemeClr val="accent2"/>
+          </a:lnRef>
+          <a:fillRef idx="0">
+            <a:schemeClr val="accent2"/>
+          </a:fillRef>
+          <a:effectRef idx="2">
+            <a:schemeClr val="accent2"/>
+          </a:effectRef>
+          <a:fontRef idx="minor">
+            <a:schemeClr val="tx1"/>
+          </a:fontRef>
+        </p:style>
+      </p:cxnSp>
+      <p:cxnSp>
+        <p:nvCxnSpPr>
+          <p:cNvPr id="14" name="Straight Connector 13">
+            <a:extLst>
+              <a:ext uri="{FF2B5EF4-FFF2-40B4-BE49-F238E27FC236}">
+                <a16:creationId xmlns:a16="http://schemas.microsoft.com/office/drawing/2014/main" id="{1B593F86-25B0-39E0-610F-A0A9CBBD2CC0}"/>
+              </a:ext>
+            </a:extLst>
+          </p:cNvPr>
+          <p:cNvCxnSpPr/>
+          <p:nvPr/>
+        </p:nvCxnSpPr>
+        <p:spPr>
+          <a:xfrm>
+            <a:off x="6385426" y="4831261"/>
+            <a:ext cx="91440" cy="0"/>
+          </a:xfrm>
+          <a:prstGeom prst="line">
+            <a:avLst/>
+          </a:prstGeom>
+          <a:ln w="38100">
+            <a:solidFill>
+              <a:srgbClr val="FF0000"/>
+            </a:solidFill>
+          </a:ln>
+        </p:spPr>
+        <p:style>
+          <a:lnRef idx="3">
+            <a:schemeClr val="accent2"/>
+          </a:lnRef>
+          <a:fillRef idx="0">
+            <a:schemeClr val="accent2"/>
+          </a:fillRef>
+          <a:effectRef idx="2">
+            <a:schemeClr val="accent2"/>
+          </a:effectRef>
+          <a:fontRef idx="minor">
+            <a:schemeClr val="tx1"/>
+          </a:fontRef>
+        </p:style>
+      </p:cxnSp>
+      <p:cxnSp>
+        <p:nvCxnSpPr>
+          <p:cNvPr id="15" name="Straight Connector 14">
+            <a:extLst>
+              <a:ext uri="{FF2B5EF4-FFF2-40B4-BE49-F238E27FC236}">
+                <a16:creationId xmlns:a16="http://schemas.microsoft.com/office/drawing/2014/main" id="{48693574-D504-7B0E-42E9-820D7B001562}"/>
+              </a:ext>
+            </a:extLst>
+          </p:cNvPr>
+          <p:cNvCxnSpPr/>
+          <p:nvPr/>
+        </p:nvCxnSpPr>
+        <p:spPr>
+          <a:xfrm>
+            <a:off x="6424662" y="2246811"/>
+            <a:ext cx="91440" cy="0"/>
+          </a:xfrm>
+          <a:prstGeom prst="line">
+            <a:avLst/>
+          </a:prstGeom>
+          <a:ln w="38100">
+            <a:solidFill>
+              <a:srgbClr val="FF0000"/>
+            </a:solidFill>
+          </a:ln>
+        </p:spPr>
+        <p:style>
+          <a:lnRef idx="3">
+            <a:schemeClr val="accent2"/>
+          </a:lnRef>
+          <a:fillRef idx="0">
+            <a:schemeClr val="accent2"/>
+          </a:fillRef>
+          <a:effectRef idx="2">
+            <a:schemeClr val="accent2"/>
+          </a:effectRef>
+          <a:fontRef idx="minor">
+            <a:schemeClr val="tx1"/>
+          </a:fontRef>
+        </p:style>
+      </p:cxnSp>
     </p:spTree>
     <p:extLst>
       <p:ext uri="{BB962C8B-B14F-4D97-AF65-F5344CB8AC3E}">
-        <p14:creationId xmlns:p14="http://schemas.microsoft.com/office/powerpoint/2010/main" val="2100407699"/>
+        <p14:creationId xmlns:p14="http://schemas.microsoft.com/office/powerpoint/2010/main" val="89388488"/>
+      </p:ext>
+    </p:extLst>
+  </p:cSld>
+  <p:clrMapOvr>
+    <a:masterClrMapping/>
+  </p:clrMapOvr>
+</p:sld>
+</file>
+
+<file path=ppt/slides/slide15.xml><?xml version="1.0" encoding="utf-8"?>
+<p:sld xmlns:a="http://schemas.openxmlformats.org/drawingml/2006/main" xmlns:r="http://schemas.openxmlformats.org/officeDocument/2006/relationships" xmlns:p="http://schemas.openxmlformats.org/presentationml/2006/main">
+  <p:cSld>
+    <p:spTree>
+      <p:nvGrpSpPr>
+        <p:cNvPr id="1" name=""/>
+        <p:cNvGrpSpPr/>
+        <p:nvPr/>
+      </p:nvGrpSpPr>
+      <p:grpSpPr>
+        <a:xfrm>
+          <a:off x="0" y="0"/>
+          <a:ext cx="0" cy="0"/>
+          <a:chOff x="0" y="0"/>
+          <a:chExt cx="0" cy="0"/>
+        </a:xfrm>
+      </p:grpSpPr>
+      <p:sp>
+        <p:nvSpPr>
+          <p:cNvPr id="2" name="Title 1">
+            <a:extLst>
+              <a:ext uri="{FF2B5EF4-FFF2-40B4-BE49-F238E27FC236}">
+                <a16:creationId xmlns:a16="http://schemas.microsoft.com/office/drawing/2014/main" id="{CF29678D-8F81-E56A-F6A0-8C3C4097DE17}"/>
+              </a:ext>
+            </a:extLst>
+          </p:cNvPr>
+          <p:cNvSpPr>
+            <a:spLocks noGrp="1"/>
+          </p:cNvSpPr>
+          <p:nvPr>
+            <p:ph type="title"/>
+          </p:nvPr>
+        </p:nvSpPr>
+        <p:spPr>
+          <a:xfrm>
+            <a:off x="838200" y="593725"/>
+            <a:ext cx="10515600" cy="658453"/>
+          </a:xfrm>
+        </p:spPr>
+        <p:txBody>
+          <a:bodyPr/>
+          <a:lstStyle/>
+          <a:p>
+            <a:r>
+              <a:rPr lang="en-US" dirty="0"/>
+              <a:t>Exploring the Comment Data</a:t>
+            </a:r>
+          </a:p>
+        </p:txBody>
+      </p:sp>
+      <p:sp>
+        <p:nvSpPr>
+          <p:cNvPr id="4" name="Date Placeholder 3">
+            <a:extLst>
+              <a:ext uri="{FF2B5EF4-FFF2-40B4-BE49-F238E27FC236}">
+                <a16:creationId xmlns:a16="http://schemas.microsoft.com/office/drawing/2014/main" id="{AFA7CBE4-FA82-518B-0A02-7B9E54F62398}"/>
+              </a:ext>
+            </a:extLst>
+          </p:cNvPr>
+          <p:cNvSpPr>
+            <a:spLocks noGrp="1"/>
+          </p:cNvSpPr>
+          <p:nvPr>
+            <p:ph type="dt" sz="half" idx="10"/>
+          </p:nvPr>
+        </p:nvSpPr>
+        <p:spPr/>
+        <p:txBody>
+          <a:bodyPr/>
+          <a:lstStyle/>
+          <a:p>
+            <a:r>
+              <a:rPr lang="en-US"/>
+              <a:t>Spring 2022</a:t>
+            </a:r>
+            <a:endParaRPr lang="en-US" dirty="0"/>
+          </a:p>
+        </p:txBody>
+      </p:sp>
+      <p:sp>
+        <p:nvSpPr>
+          <p:cNvPr id="5" name="Footer Placeholder 4">
+            <a:extLst>
+              <a:ext uri="{FF2B5EF4-FFF2-40B4-BE49-F238E27FC236}">
+                <a16:creationId xmlns:a16="http://schemas.microsoft.com/office/drawing/2014/main" id="{AB832FC6-77F0-47C2-CFAF-FF79B68F319D}"/>
+              </a:ext>
+            </a:extLst>
+          </p:cNvPr>
+          <p:cNvSpPr>
+            <a:spLocks noGrp="1"/>
+          </p:cNvSpPr>
+          <p:nvPr>
+            <p:ph type="ftr" sz="quarter" idx="11"/>
+          </p:nvPr>
+        </p:nvSpPr>
+        <p:spPr/>
+        <p:txBody>
+          <a:bodyPr/>
+          <a:lstStyle/>
+          <a:p>
+            <a:r>
+              <a:rPr lang="en-US"/>
+              <a:t>Data Wrangling - Final Project</a:t>
+            </a:r>
+            <a:endParaRPr lang="en-US" dirty="0"/>
+          </a:p>
+        </p:txBody>
+      </p:sp>
+      <p:sp>
+        <p:nvSpPr>
+          <p:cNvPr id="6" name="Slide Number Placeholder 5">
+            <a:extLst>
+              <a:ext uri="{FF2B5EF4-FFF2-40B4-BE49-F238E27FC236}">
+                <a16:creationId xmlns:a16="http://schemas.microsoft.com/office/drawing/2014/main" id="{24FDEF54-5C21-2713-7391-EED9F018AA85}"/>
+              </a:ext>
+            </a:extLst>
+          </p:cNvPr>
+          <p:cNvSpPr>
+            <a:spLocks noGrp="1"/>
+          </p:cNvSpPr>
+          <p:nvPr>
+            <p:ph type="sldNum" sz="quarter" idx="12"/>
+          </p:nvPr>
+        </p:nvSpPr>
+        <p:spPr/>
+        <p:txBody>
+          <a:bodyPr/>
+          <a:lstStyle/>
+          <a:p>
+            <a:fld id="{B5CEABB6-07DC-46E8-9B57-56EC44A396E5}" type="slidenum">
+              <a:rPr lang="en-US" smtClean="0"/>
+              <a:t>15</a:t>
+            </a:fld>
+            <a:endParaRPr lang="en-US" dirty="0"/>
+          </a:p>
+        </p:txBody>
+      </p:sp>
+    </p:spTree>
+    <p:extLst>
+      <p:ext uri="{BB962C8B-B14F-4D97-AF65-F5344CB8AC3E}">
+        <p14:creationId xmlns:p14="http://schemas.microsoft.com/office/powerpoint/2010/main" val="769344243"/>
+      </p:ext>
+    </p:extLst>
+  </p:cSld>
+  <p:clrMapOvr>
+    <a:masterClrMapping/>
+  </p:clrMapOvr>
+</p:sld>
+</file>
+
+<file path=ppt/slides/slide16.xml><?xml version="1.0" encoding="utf-8"?>
+<p:sld xmlns:a="http://schemas.openxmlformats.org/drawingml/2006/main" xmlns:r="http://schemas.openxmlformats.org/officeDocument/2006/relationships" xmlns:p="http://schemas.openxmlformats.org/presentationml/2006/main">
+  <p:cSld>
+    <p:spTree>
+      <p:nvGrpSpPr>
+        <p:cNvPr id="1" name=""/>
+        <p:cNvGrpSpPr/>
+        <p:nvPr/>
+      </p:nvGrpSpPr>
+      <p:grpSpPr>
+        <a:xfrm>
+          <a:off x="0" y="0"/>
+          <a:ext cx="0" cy="0"/>
+          <a:chOff x="0" y="0"/>
+          <a:chExt cx="0" cy="0"/>
+        </a:xfrm>
+      </p:grpSpPr>
+      <p:sp>
+        <p:nvSpPr>
+          <p:cNvPr id="2" name="Title 1">
+            <a:extLst>
+              <a:ext uri="{FF2B5EF4-FFF2-40B4-BE49-F238E27FC236}">
+                <a16:creationId xmlns:a16="http://schemas.microsoft.com/office/drawing/2014/main" id="{CF29678D-8F81-E56A-F6A0-8C3C4097DE17}"/>
+              </a:ext>
+            </a:extLst>
+          </p:cNvPr>
+          <p:cNvSpPr>
+            <a:spLocks noGrp="1"/>
+          </p:cNvSpPr>
+          <p:nvPr>
+            <p:ph type="title"/>
+          </p:nvPr>
+        </p:nvSpPr>
+        <p:spPr>
+          <a:xfrm>
+            <a:off x="838200" y="593725"/>
+            <a:ext cx="10515600" cy="658453"/>
+          </a:xfrm>
+        </p:spPr>
+        <p:txBody>
+          <a:bodyPr/>
+          <a:lstStyle/>
+          <a:p>
+            <a:r>
+              <a:rPr lang="en-US" dirty="0"/>
+              <a:t>Creating the Model</a:t>
+            </a:r>
+          </a:p>
+        </p:txBody>
+      </p:sp>
+      <p:sp>
+        <p:nvSpPr>
+          <p:cNvPr id="4" name="Date Placeholder 3">
+            <a:extLst>
+              <a:ext uri="{FF2B5EF4-FFF2-40B4-BE49-F238E27FC236}">
+                <a16:creationId xmlns:a16="http://schemas.microsoft.com/office/drawing/2014/main" id="{AFA7CBE4-FA82-518B-0A02-7B9E54F62398}"/>
+              </a:ext>
+            </a:extLst>
+          </p:cNvPr>
+          <p:cNvSpPr>
+            <a:spLocks noGrp="1"/>
+          </p:cNvSpPr>
+          <p:nvPr>
+            <p:ph type="dt" sz="half" idx="10"/>
+          </p:nvPr>
+        </p:nvSpPr>
+        <p:spPr/>
+        <p:txBody>
+          <a:bodyPr/>
+          <a:lstStyle/>
+          <a:p>
+            <a:r>
+              <a:rPr lang="en-US"/>
+              <a:t>Spring 2022</a:t>
+            </a:r>
+            <a:endParaRPr lang="en-US" dirty="0"/>
+          </a:p>
+        </p:txBody>
+      </p:sp>
+      <p:sp>
+        <p:nvSpPr>
+          <p:cNvPr id="5" name="Footer Placeholder 4">
+            <a:extLst>
+              <a:ext uri="{FF2B5EF4-FFF2-40B4-BE49-F238E27FC236}">
+                <a16:creationId xmlns:a16="http://schemas.microsoft.com/office/drawing/2014/main" id="{AB832FC6-77F0-47C2-CFAF-FF79B68F319D}"/>
+              </a:ext>
+            </a:extLst>
+          </p:cNvPr>
+          <p:cNvSpPr>
+            <a:spLocks noGrp="1"/>
+          </p:cNvSpPr>
+          <p:nvPr>
+            <p:ph type="ftr" sz="quarter" idx="11"/>
+          </p:nvPr>
+        </p:nvSpPr>
+        <p:spPr/>
+        <p:txBody>
+          <a:bodyPr/>
+          <a:lstStyle/>
+          <a:p>
+            <a:r>
+              <a:rPr lang="en-US"/>
+              <a:t>Data Wrangling - Final Project</a:t>
+            </a:r>
+            <a:endParaRPr lang="en-US" dirty="0"/>
+          </a:p>
+        </p:txBody>
+      </p:sp>
+      <p:sp>
+        <p:nvSpPr>
+          <p:cNvPr id="6" name="Slide Number Placeholder 5">
+            <a:extLst>
+              <a:ext uri="{FF2B5EF4-FFF2-40B4-BE49-F238E27FC236}">
+                <a16:creationId xmlns:a16="http://schemas.microsoft.com/office/drawing/2014/main" id="{24FDEF54-5C21-2713-7391-EED9F018AA85}"/>
+              </a:ext>
+            </a:extLst>
+          </p:cNvPr>
+          <p:cNvSpPr>
+            <a:spLocks noGrp="1"/>
+          </p:cNvSpPr>
+          <p:nvPr>
+            <p:ph type="sldNum" sz="quarter" idx="12"/>
+          </p:nvPr>
+        </p:nvSpPr>
+        <p:spPr/>
+        <p:txBody>
+          <a:bodyPr/>
+          <a:lstStyle/>
+          <a:p>
+            <a:fld id="{B5CEABB6-07DC-46E8-9B57-56EC44A396E5}" type="slidenum">
+              <a:rPr lang="en-US" smtClean="0"/>
+              <a:t>16</a:t>
+            </a:fld>
+            <a:endParaRPr lang="en-US" dirty="0"/>
+          </a:p>
+        </p:txBody>
+      </p:sp>
+      <p:sp>
+        <p:nvSpPr>
+          <p:cNvPr id="3" name="Oval 2">
+            <a:extLst>
+              <a:ext uri="{FF2B5EF4-FFF2-40B4-BE49-F238E27FC236}">
+                <a16:creationId xmlns:a16="http://schemas.microsoft.com/office/drawing/2014/main" id="{2B159EF0-AB4C-40D9-718F-25921B8F40F4}"/>
+              </a:ext>
+            </a:extLst>
+          </p:cNvPr>
+          <p:cNvSpPr/>
+          <p:nvPr/>
+        </p:nvSpPr>
+        <p:spPr>
+          <a:xfrm>
+            <a:off x="1263316" y="1621510"/>
+            <a:ext cx="3801979" cy="1614055"/>
+          </a:xfrm>
+          <a:prstGeom prst="ellipse">
+            <a:avLst/>
+          </a:prstGeom>
+          <a:solidFill>
+            <a:schemeClr val="accent1">
+              <a:lumMod val="90000"/>
+            </a:schemeClr>
+          </a:solidFill>
+          <a:ln>
+            <a:noFill/>
+          </a:ln>
+        </p:spPr>
+        <p:style>
+          <a:lnRef idx="2">
+            <a:schemeClr val="accent1">
+              <a:shade val="50000"/>
+            </a:schemeClr>
+          </a:lnRef>
+          <a:fillRef idx="1">
+            <a:schemeClr val="accent1"/>
+          </a:fillRef>
+          <a:effectRef idx="0">
+            <a:schemeClr val="accent1"/>
+          </a:effectRef>
+          <a:fontRef idx="minor">
+            <a:schemeClr val="lt1"/>
+          </a:fontRef>
+        </p:style>
+        <p:txBody>
+          <a:bodyPr rtlCol="0" anchor="ctr"/>
+          <a:lstStyle/>
+          <a:p>
+            <a:pPr algn="ctr"/>
+            <a:endParaRPr lang="en-US" dirty="0"/>
+          </a:p>
+        </p:txBody>
+      </p:sp>
+      <p:sp>
+        <p:nvSpPr>
+          <p:cNvPr id="7" name="TextBox 6">
+            <a:extLst>
+              <a:ext uri="{FF2B5EF4-FFF2-40B4-BE49-F238E27FC236}">
+                <a16:creationId xmlns:a16="http://schemas.microsoft.com/office/drawing/2014/main" id="{67510CA6-7112-32F3-655F-7A0744F7CBCE}"/>
+              </a:ext>
+            </a:extLst>
+          </p:cNvPr>
+          <p:cNvSpPr txBox="1"/>
+          <p:nvPr/>
+        </p:nvSpPr>
+        <p:spPr>
+          <a:xfrm>
+            <a:off x="1762691" y="1834789"/>
+            <a:ext cx="1854803" cy="369332"/>
+          </a:xfrm>
+          <a:prstGeom prst="rect">
+            <a:avLst/>
+          </a:prstGeom>
+          <a:noFill/>
+        </p:spPr>
+        <p:txBody>
+          <a:bodyPr wrap="none" rtlCol="0">
+            <a:spAutoFit/>
+          </a:bodyPr>
+          <a:lstStyle/>
+          <a:p>
+            <a:r>
+              <a:rPr lang="en-US" dirty="0" err="1"/>
+              <a:t>parentPopularity</a:t>
+            </a:r>
+            <a:endParaRPr lang="en-US" dirty="0"/>
+          </a:p>
+        </p:txBody>
+      </p:sp>
+      <p:sp>
+        <p:nvSpPr>
+          <p:cNvPr id="8" name="TextBox 7">
+            <a:extLst>
+              <a:ext uri="{FF2B5EF4-FFF2-40B4-BE49-F238E27FC236}">
+                <a16:creationId xmlns:a16="http://schemas.microsoft.com/office/drawing/2014/main" id="{37D214EB-2E2B-060B-B59B-FD879DCA60AC}"/>
+              </a:ext>
+            </a:extLst>
+          </p:cNvPr>
+          <p:cNvSpPr txBox="1"/>
+          <p:nvPr/>
+        </p:nvSpPr>
+        <p:spPr>
+          <a:xfrm>
+            <a:off x="2883885" y="2243871"/>
+            <a:ext cx="1843774" cy="369332"/>
+          </a:xfrm>
+          <a:prstGeom prst="rect">
+            <a:avLst/>
+          </a:prstGeom>
+          <a:noFill/>
+        </p:spPr>
+        <p:txBody>
+          <a:bodyPr wrap="none" rtlCol="0">
+            <a:spAutoFit/>
+          </a:bodyPr>
+          <a:lstStyle/>
+          <a:p>
+            <a:r>
+              <a:rPr lang="en-US" dirty="0" err="1"/>
+              <a:t>parentSentiment</a:t>
+            </a:r>
+            <a:endParaRPr lang="en-US" dirty="0"/>
+          </a:p>
+        </p:txBody>
+      </p:sp>
+      <p:sp>
+        <p:nvSpPr>
+          <p:cNvPr id="9" name="TextBox 8">
+            <a:extLst>
+              <a:ext uri="{FF2B5EF4-FFF2-40B4-BE49-F238E27FC236}">
+                <a16:creationId xmlns:a16="http://schemas.microsoft.com/office/drawing/2014/main" id="{BDBC1682-76B4-BFEA-2B13-59D32B9D895F}"/>
+              </a:ext>
+            </a:extLst>
+          </p:cNvPr>
+          <p:cNvSpPr txBox="1"/>
+          <p:nvPr/>
+        </p:nvSpPr>
+        <p:spPr>
+          <a:xfrm>
+            <a:off x="2068170" y="2673534"/>
+            <a:ext cx="1856021" cy="369332"/>
+          </a:xfrm>
+          <a:prstGeom prst="rect">
+            <a:avLst/>
+          </a:prstGeom>
+          <a:noFill/>
+        </p:spPr>
+        <p:txBody>
+          <a:bodyPr wrap="none" rtlCol="0">
+            <a:spAutoFit/>
+          </a:bodyPr>
+          <a:lstStyle/>
+          <a:p>
+            <a:r>
+              <a:rPr lang="en-US" dirty="0" err="1"/>
+              <a:t>overallSentiment</a:t>
+            </a:r>
+            <a:endParaRPr lang="en-US" dirty="0"/>
+          </a:p>
+        </p:txBody>
+      </p:sp>
+      <p:sp>
+        <p:nvSpPr>
+          <p:cNvPr id="10" name="TextBox 9">
+            <a:extLst>
+              <a:ext uri="{FF2B5EF4-FFF2-40B4-BE49-F238E27FC236}">
+                <a16:creationId xmlns:a16="http://schemas.microsoft.com/office/drawing/2014/main" id="{7CF7DC16-2CCD-6EC4-AD8F-139C81BB1162}"/>
+              </a:ext>
+            </a:extLst>
+          </p:cNvPr>
+          <p:cNvSpPr txBox="1"/>
+          <p:nvPr/>
+        </p:nvSpPr>
+        <p:spPr>
+          <a:xfrm>
+            <a:off x="7603792" y="2243871"/>
+            <a:ext cx="2378408" cy="369332"/>
+          </a:xfrm>
+          <a:prstGeom prst="rect">
+            <a:avLst/>
+          </a:prstGeom>
+          <a:noFill/>
+        </p:spPr>
+        <p:txBody>
+          <a:bodyPr wrap="none" rtlCol="0">
+            <a:spAutoFit/>
+          </a:bodyPr>
+          <a:lstStyle/>
+          <a:p>
+            <a:r>
+              <a:rPr lang="en-US" dirty="0"/>
+              <a:t>Comment’s Popularity</a:t>
+            </a:r>
+          </a:p>
+        </p:txBody>
+      </p:sp>
+      <p:cxnSp>
+        <p:nvCxnSpPr>
+          <p:cNvPr id="12" name="Straight Arrow Connector 11">
+            <a:extLst>
+              <a:ext uri="{FF2B5EF4-FFF2-40B4-BE49-F238E27FC236}">
+                <a16:creationId xmlns:a16="http://schemas.microsoft.com/office/drawing/2014/main" id="{6B6B20B9-5664-072B-A21E-8155989076DA}"/>
+              </a:ext>
+            </a:extLst>
+          </p:cNvPr>
+          <p:cNvCxnSpPr/>
+          <p:nvPr/>
+        </p:nvCxnSpPr>
+        <p:spPr>
+          <a:xfrm>
+            <a:off x="5478463" y="2428537"/>
+            <a:ext cx="1600117" cy="0"/>
+          </a:xfrm>
+          <a:prstGeom prst="straightConnector1">
+            <a:avLst/>
+          </a:prstGeom>
+          <a:ln w="38100">
+            <a:tailEnd type="triangle"/>
+          </a:ln>
+        </p:spPr>
+        <p:style>
+          <a:lnRef idx="3">
+            <a:schemeClr val="dk1"/>
+          </a:lnRef>
+          <a:fillRef idx="0">
+            <a:schemeClr val="dk1"/>
+          </a:fillRef>
+          <a:effectRef idx="2">
+            <a:schemeClr val="dk1"/>
+          </a:effectRef>
+          <a:fontRef idx="minor">
+            <a:schemeClr val="tx1"/>
+          </a:fontRef>
+        </p:style>
+      </p:cxnSp>
+    </p:spTree>
+    <p:extLst>
+      <p:ext uri="{BB962C8B-B14F-4D97-AF65-F5344CB8AC3E}">
+        <p14:creationId xmlns:p14="http://schemas.microsoft.com/office/powerpoint/2010/main" val="3509070087"/>
       </p:ext>
     </p:extLst>
   </p:cSld>
@@ -24725,6 +25516,25 @@
 </file>
 
 <file path=customXml/item2.xml><?xml version="1.0" encoding="utf-8"?>
+<p:properties xmlns:p="http://schemas.microsoft.com/office/2006/metadata/properties" xmlns:xsi="http://www.w3.org/2001/XMLSchema-instance" xmlns:pc="http://schemas.microsoft.com/office/infopath/2007/PartnerControls">
+  <documentManagement>
+    <_ip_UnifiedCompliancePolicyUIAction xmlns="http://schemas.microsoft.com/sharepoint/v3" xsi:nil="true"/>
+    <Image xmlns="71af3243-3dd4-4a8d-8c0d-dd76da1f02a5">
+      <Url xsi:nil="true"/>
+      <Description xsi:nil="true"/>
+    </Image>
+    <Status xmlns="71af3243-3dd4-4a8d-8c0d-dd76da1f02a5">Not started</Status>
+    <_ip_UnifiedCompliancePolicyProperties xmlns="http://schemas.microsoft.com/sharepoint/v3" xsi:nil="true"/>
+    <ImageTagsTaxHTField xmlns="71af3243-3dd4-4a8d-8c0d-dd76da1f02a5">
+      <Terms xmlns="http://schemas.microsoft.com/office/infopath/2007/PartnerControls"/>
+    </ImageTagsTaxHTField>
+    <TaxCatchAll xmlns="230e9df3-be65-4c73-a93b-d1236ebd677e"/>
+    <MediaServiceKeyPoints xmlns="71af3243-3dd4-4a8d-8c0d-dd76da1f02a5" xsi:nil="true"/>
+  </documentManagement>
+</p:properties>
+</file>
+
+<file path=customXml/item3.xml><?xml version="1.0" encoding="utf-8"?>
 <ct:contentTypeSchema xmlns:ct="http://schemas.microsoft.com/office/2006/metadata/contentType" xmlns:ma="http://schemas.microsoft.com/office/2006/metadata/properties/metaAttributes" ct:_="" ma:_="" ma:contentTypeName="Document" ma:contentTypeID="0x01010079F111ED35F8CC479449609E8A0923A6" ma:contentTypeVersion="20" ma:contentTypeDescription="Create a new document." ma:contentTypeScope="" ma:versionID="1267097ee5f5874adfcc408041ae252e">
   <xsd:schema xmlns:xsd="http://www.w3.org/2001/XMLSchema" xmlns:xs="http://www.w3.org/2001/XMLSchema" xmlns:p="http://schemas.microsoft.com/office/2006/metadata/properties" xmlns:ns1="http://schemas.microsoft.com/sharepoint/v3" xmlns:ns2="71af3243-3dd4-4a8d-8c0d-dd76da1f02a5" xmlns:ns3="16c05727-aa75-4e4a-9b5f-8a80a1165891" xmlns:ns4="230e9df3-be65-4c73-a93b-d1236ebd677e" targetNamespace="http://schemas.microsoft.com/office/2006/metadata/properties" ma:root="true" ma:fieldsID="395891a93df65b14727750f2c06c306c" ns1:_="" ns2:_="" ns3:_="" ns4:_="">
     <xsd:import namespace="http://schemas.microsoft.com/sharepoint/v3"/>
@@ -25000,25 +25810,6 @@
 </ct:contentTypeSchema>
 </file>
 
-<file path=customXml/item3.xml><?xml version="1.0" encoding="utf-8"?>
-<p:properties xmlns:p="http://schemas.microsoft.com/office/2006/metadata/properties" xmlns:xsi="http://www.w3.org/2001/XMLSchema-instance" xmlns:pc="http://schemas.microsoft.com/office/infopath/2007/PartnerControls">
-  <documentManagement>
-    <_ip_UnifiedCompliancePolicyUIAction xmlns="http://schemas.microsoft.com/sharepoint/v3" xsi:nil="true"/>
-    <Image xmlns="71af3243-3dd4-4a8d-8c0d-dd76da1f02a5">
-      <Url xsi:nil="true"/>
-      <Description xsi:nil="true"/>
-    </Image>
-    <Status xmlns="71af3243-3dd4-4a8d-8c0d-dd76da1f02a5">Not started</Status>
-    <_ip_UnifiedCompliancePolicyProperties xmlns="http://schemas.microsoft.com/sharepoint/v3" xsi:nil="true"/>
-    <ImageTagsTaxHTField xmlns="71af3243-3dd4-4a8d-8c0d-dd76da1f02a5">
-      <Terms xmlns="http://schemas.microsoft.com/office/infopath/2007/PartnerControls"/>
-    </ImageTagsTaxHTField>
-    <TaxCatchAll xmlns="230e9df3-be65-4c73-a93b-d1236ebd677e"/>
-    <MediaServiceKeyPoints xmlns="71af3243-3dd4-4a8d-8c0d-dd76da1f02a5" xsi:nil="true"/>
-  </documentManagement>
-</p:properties>
-</file>
-
 <file path=customXml/itemProps1.xml><?xml version="1.0" encoding="utf-8"?>
 <ds:datastoreItem xmlns:ds="http://schemas.openxmlformats.org/officeDocument/2006/customXml" ds:itemID="{2D446390-8521-40A2-A462-EA068123BED9}">
   <ds:schemaRefs>
@@ -25028,6 +25819,18 @@
 </file>
 
 <file path=customXml/itemProps2.xml><?xml version="1.0" encoding="utf-8"?>
+<ds:datastoreItem xmlns:ds="http://schemas.openxmlformats.org/officeDocument/2006/customXml" ds:itemID="{B5BA3906-9696-4247-AC0D-DD5C26B2A70A}">
+  <ds:schemaRefs>
+    <ds:schemaRef ds:uri="http://schemas.microsoft.com/office/2006/metadata/properties"/>
+    <ds:schemaRef ds:uri="http://schemas.microsoft.com/office/infopath/2007/PartnerControls"/>
+    <ds:schemaRef ds:uri="http://schemas.microsoft.com/sharepoint/v3"/>
+    <ds:schemaRef ds:uri="71af3243-3dd4-4a8d-8c0d-dd76da1f02a5"/>
+    <ds:schemaRef ds:uri="230e9df3-be65-4c73-a93b-d1236ebd677e"/>
+  </ds:schemaRefs>
+</ds:datastoreItem>
+</file>
+
+<file path=customXml/itemProps3.xml><?xml version="1.0" encoding="utf-8"?>
 <ds:datastoreItem xmlns:ds="http://schemas.openxmlformats.org/officeDocument/2006/customXml" ds:itemID="{01E84A1C-2814-43A7-9448-348326113A45}">
   <ds:schemaRefs>
     <ds:schemaRef ds:uri="http://schemas.microsoft.com/office/2006/metadata/contentType"/>
@@ -25048,18 +25851,6 @@
 </ds:datastoreItem>
 </file>
 
-<file path=customXml/itemProps3.xml><?xml version="1.0" encoding="utf-8"?>
-<ds:datastoreItem xmlns:ds="http://schemas.openxmlformats.org/officeDocument/2006/customXml" ds:itemID="{B5BA3906-9696-4247-AC0D-DD5C26B2A70A}">
-  <ds:schemaRefs>
-    <ds:schemaRef ds:uri="http://schemas.microsoft.com/office/2006/metadata/properties"/>
-    <ds:schemaRef ds:uri="http://schemas.microsoft.com/office/infopath/2007/PartnerControls"/>
-    <ds:schemaRef ds:uri="http://schemas.microsoft.com/sharepoint/v3"/>
-    <ds:schemaRef ds:uri="71af3243-3dd4-4a8d-8c0d-dd76da1f02a5"/>
-    <ds:schemaRef ds:uri="230e9df3-be65-4c73-a93b-d1236ebd677e"/>
-  </ds:schemaRefs>
-</ds:datastoreItem>
-</file>
-
 <file path=docMetadata/LabelInfo.xml><?xml version="1.0" encoding="utf-8"?>
 <clbl:labelList xmlns:clbl="http://schemas.microsoft.com/office/2020/mipLabelMetadata">
   <clbl:label id="{f42aa342-8706-4288-bd11-ebb85995028c}" enabled="1" method="Standard" siteId="{72f988bf-86f1-41af-91ab-2d7cd011db47}" removed="0"/>

</xml_diff>

<commit_message>
DA Changes, 5.1 AM
Updated slides, analysis script --- REMOVED Polarization Coefficient, changed to simple linear models (easier to perform, explain)
</commit_message>
<xml_diff>
--- a/Final.Project_Presentation.Slides_v1.pptx
+++ b/Final.Project_Presentation.Slides_v1.pptx
@@ -5,10 +5,10 @@
     <p:sldMasterId id="2147483666" r:id="rId4"/>
   </p:sldMasterIdLst>
   <p:notesMasterIdLst>
-    <p:notesMasterId r:id="rId21"/>
+    <p:notesMasterId r:id="rId31"/>
   </p:notesMasterIdLst>
   <p:handoutMasterIdLst>
-    <p:handoutMasterId r:id="rId22"/>
+    <p:handoutMasterId r:id="rId32"/>
   </p:handoutMasterIdLst>
   <p:sldIdLst>
     <p:sldId id="256" r:id="rId5"/>
@@ -26,7 +26,17 @@
     <p:sldId id="268" r:id="rId17"/>
     <p:sldId id="270" r:id="rId18"/>
     <p:sldId id="271" r:id="rId19"/>
-    <p:sldId id="272" r:id="rId20"/>
+    <p:sldId id="273" r:id="rId20"/>
+    <p:sldId id="272" r:id="rId21"/>
+    <p:sldId id="274" r:id="rId22"/>
+    <p:sldId id="275" r:id="rId23"/>
+    <p:sldId id="277" r:id="rId24"/>
+    <p:sldId id="279" r:id="rId25"/>
+    <p:sldId id="280" r:id="rId26"/>
+    <p:sldId id="281" r:id="rId27"/>
+    <p:sldId id="282" r:id="rId28"/>
+    <p:sldId id="283" r:id="rId29"/>
+    <p:sldId id="284" r:id="rId30"/>
   </p:sldIdLst>
   <p:sldSz cx="12192000" cy="6858000"/>
   <p:notesSz cx="6858000" cy="9144000"/>
@@ -3556,6 +3566,90 @@
 </p:notesMaster>
 </file>
 
+<file path=ppt/notesSlides/notesSlide1.xml><?xml version="1.0" encoding="utf-8"?>
+<p:notes xmlns:a="http://schemas.openxmlformats.org/drawingml/2006/main" xmlns:r="http://schemas.openxmlformats.org/officeDocument/2006/relationships" xmlns:p="http://schemas.openxmlformats.org/presentationml/2006/main">
+  <p:cSld>
+    <p:spTree>
+      <p:nvGrpSpPr>
+        <p:cNvPr id="1" name=""/>
+        <p:cNvGrpSpPr/>
+        <p:nvPr/>
+      </p:nvGrpSpPr>
+      <p:grpSpPr>
+        <a:xfrm>
+          <a:off x="0" y="0"/>
+          <a:ext cx="0" cy="0"/>
+          <a:chOff x="0" y="0"/>
+          <a:chExt cx="0" cy="0"/>
+        </a:xfrm>
+      </p:grpSpPr>
+      <p:sp>
+        <p:nvSpPr>
+          <p:cNvPr id="2" name="Slide Image Placeholder 1"/>
+          <p:cNvSpPr>
+            <a:spLocks noGrp="1" noRot="1" noChangeAspect="1"/>
+          </p:cNvSpPr>
+          <p:nvPr>
+            <p:ph type="sldImg"/>
+          </p:nvPr>
+        </p:nvSpPr>
+        <p:spPr/>
+      </p:sp>
+      <p:sp>
+        <p:nvSpPr>
+          <p:cNvPr id="3" name="Notes Placeholder 2"/>
+          <p:cNvSpPr>
+            <a:spLocks noGrp="1"/>
+          </p:cNvSpPr>
+          <p:nvPr>
+            <p:ph type="body" idx="1"/>
+          </p:nvPr>
+        </p:nvSpPr>
+        <p:spPr/>
+        <p:txBody>
+          <a:bodyPr/>
+          <a:lstStyle/>
+          <a:p>
+            <a:endParaRPr lang="en-US" dirty="0"/>
+          </a:p>
+        </p:txBody>
+      </p:sp>
+      <p:sp>
+        <p:nvSpPr>
+          <p:cNvPr id="4" name="Slide Number Placeholder 3"/>
+          <p:cNvSpPr>
+            <a:spLocks noGrp="1"/>
+          </p:cNvSpPr>
+          <p:nvPr>
+            <p:ph type="sldNum" sz="quarter" idx="5"/>
+          </p:nvPr>
+        </p:nvSpPr>
+        <p:spPr/>
+        <p:txBody>
+          <a:bodyPr/>
+          <a:lstStyle/>
+          <a:p>
+            <a:fld id="{D4B9A9E5-4F7F-4A7D-9DE1-899232329269}" type="slidenum">
+              <a:rPr lang="en-US" smtClean="0"/>
+              <a:t>20</a:t>
+            </a:fld>
+            <a:endParaRPr lang="en-US" dirty="0"/>
+          </a:p>
+        </p:txBody>
+      </p:sp>
+    </p:spTree>
+    <p:extLst>
+      <p:ext uri="{BB962C8B-B14F-4D97-AF65-F5344CB8AC3E}">
+        <p14:creationId xmlns:p14="http://schemas.microsoft.com/office/powerpoint/2010/main" val="4027822609"/>
+      </p:ext>
+    </p:extLst>
+  </p:cSld>
+  <p:clrMapOvr>
+    <a:masterClrMapping/>
+  </p:clrMapOvr>
+</p:notes>
+</file>
+
 <file path=ppt/slideLayouts/slideLayout1.xml><?xml version="1.0" encoding="utf-8"?>
 <p:sldLayout xmlns:a="http://schemas.openxmlformats.org/drawingml/2006/main" xmlns:r="http://schemas.openxmlformats.org/officeDocument/2006/relationships" xmlns:p="http://schemas.openxmlformats.org/presentationml/2006/main" type="title" preserve="1">
   <p:cSld name="Title Slide">
@@ -20064,7 +20158,7 @@
         </p:blipFill>
         <p:spPr>
           <a:xfrm>
-            <a:off x="888670" y="1692275"/>
+            <a:off x="888670" y="1583988"/>
             <a:ext cx="4928260" cy="4572000"/>
           </a:xfrm>
           <a:prstGeom prst="rect">
@@ -20094,7 +20188,7 @@
         </p:blipFill>
         <p:spPr>
           <a:xfrm>
-            <a:off x="6096000" y="1692275"/>
+            <a:off x="6096000" y="1583988"/>
             <a:ext cx="4928259" cy="4572000"/>
           </a:xfrm>
           <a:prstGeom prst="rect">
@@ -20116,7 +20210,7 @@
         </p:nvSpPr>
         <p:spPr>
           <a:xfrm>
-            <a:off x="1167741" y="1337591"/>
+            <a:off x="1167741" y="1229304"/>
             <a:ext cx="4507516" cy="369332"/>
           </a:xfrm>
           <a:prstGeom prst="rect">
@@ -20164,7 +20258,7 @@
         </p:nvSpPr>
         <p:spPr>
           <a:xfrm>
-            <a:off x="6516745" y="1337591"/>
+            <a:off x="6516745" y="1229304"/>
             <a:ext cx="4628575" cy="369332"/>
           </a:xfrm>
           <a:prstGeom prst="rect">
@@ -20212,7 +20306,7 @@
         </p:nvCxnSpPr>
         <p:spPr>
           <a:xfrm>
-            <a:off x="6229851" y="4545511"/>
+            <a:off x="6229851" y="4437224"/>
             <a:ext cx="91440" cy="0"/>
           </a:xfrm>
           <a:prstGeom prst="line">
@@ -20253,7 +20347,7 @@
         </p:nvCxnSpPr>
         <p:spPr>
           <a:xfrm>
-            <a:off x="6385426" y="4831261"/>
+            <a:off x="6385426" y="4722974"/>
             <a:ext cx="91440" cy="0"/>
           </a:xfrm>
           <a:prstGeom prst="line">
@@ -20294,7 +20388,7 @@
         </p:nvCxnSpPr>
         <p:spPr>
           <a:xfrm>
-            <a:off x="6424662" y="2246811"/>
+            <a:off x="6424662" y="2138524"/>
             <a:ext cx="91440" cy="0"/>
           </a:xfrm>
           <a:prstGeom prst="line">
@@ -20321,6 +20415,42 @@
           </a:fontRef>
         </p:style>
       </p:cxnSp>
+      <p:sp>
+        <p:nvSpPr>
+          <p:cNvPr id="17" name="TextBox 16">
+            <a:extLst>
+              <a:ext uri="{FF2B5EF4-FFF2-40B4-BE49-F238E27FC236}">
+                <a16:creationId xmlns:a16="http://schemas.microsoft.com/office/drawing/2014/main" id="{A0819695-185E-9353-6C35-6A4C95CD4150}"/>
+              </a:ext>
+            </a:extLst>
+          </p:cNvPr>
+          <p:cNvSpPr txBox="1"/>
+          <p:nvPr/>
+        </p:nvSpPr>
+        <p:spPr>
+          <a:xfrm>
+            <a:off x="7289255" y="6071503"/>
+            <a:ext cx="4654159" cy="369332"/>
+          </a:xfrm>
+          <a:prstGeom prst="rect">
+            <a:avLst/>
+          </a:prstGeom>
+          <a:noFill/>
+        </p:spPr>
+        <p:txBody>
+          <a:bodyPr wrap="none" rtlCol="0">
+            <a:spAutoFit/>
+          </a:bodyPr>
+          <a:lstStyle/>
+          <a:p>
+            <a:pPr algn="r"/>
+            <a:r>
+              <a:rPr lang="en-US" i="1" dirty="0"/>
+              <a:t>Removed words like “game” with stop words</a:t>
+            </a:r>
+          </a:p>
+        </p:txBody>
+      </p:sp>
     </p:spTree>
     <p:extLst>
       <p:ext uri="{BB962C8B-B14F-4D97-AF65-F5344CB8AC3E}">
@@ -20471,6 +20601,41 @@
           </a:p>
         </p:txBody>
       </p:sp>
+      <p:sp>
+        <p:nvSpPr>
+          <p:cNvPr id="3" name="TextBox 2">
+            <a:extLst>
+              <a:ext uri="{FF2B5EF4-FFF2-40B4-BE49-F238E27FC236}">
+                <a16:creationId xmlns:a16="http://schemas.microsoft.com/office/drawing/2014/main" id="{92C2A542-4282-1132-EE9E-772159D43DC1}"/>
+              </a:ext>
+            </a:extLst>
+          </p:cNvPr>
+          <p:cNvSpPr txBox="1"/>
+          <p:nvPr/>
+        </p:nvSpPr>
+        <p:spPr>
+          <a:xfrm>
+            <a:off x="4654451" y="3244334"/>
+            <a:ext cx="2883097" cy="369332"/>
+          </a:xfrm>
+          <a:prstGeom prst="rect">
+            <a:avLst/>
+          </a:prstGeom>
+          <a:noFill/>
+        </p:spPr>
+        <p:txBody>
+          <a:bodyPr wrap="none" rtlCol="0">
+            <a:spAutoFit/>
+          </a:bodyPr>
+          <a:lstStyle/>
+          <a:p>
+            <a:r>
+              <a:rPr lang="en-US" dirty="0"/>
+              <a:t>ANOTHER VISUALIZATION?</a:t>
+            </a:r>
+          </a:p>
+        </p:txBody>
+      </p:sp>
     </p:spTree>
     <p:extLst>
       <p:ext uri="{BB962C8B-B14F-4D97-AF65-F5344CB8AC3E}">
@@ -20506,7 +20671,7 @@
           <p:cNvPr id="2" name="Title 1">
             <a:extLst>
               <a:ext uri="{FF2B5EF4-FFF2-40B4-BE49-F238E27FC236}">
-                <a16:creationId xmlns:a16="http://schemas.microsoft.com/office/drawing/2014/main" id="{CF29678D-8F81-E56A-F6A0-8C3C4097DE17}"/>
+                <a16:creationId xmlns:a16="http://schemas.microsoft.com/office/drawing/2014/main" id="{B96EE367-8D4A-3DEF-9F97-401EE2B088DD}"/>
               </a:ext>
             </a:extLst>
           </p:cNvPr>
@@ -20517,19 +20682,14 @@
             <p:ph type="title"/>
           </p:nvPr>
         </p:nvSpPr>
-        <p:spPr>
-          <a:xfrm>
-            <a:off x="838200" y="593725"/>
-            <a:ext cx="10515600" cy="658453"/>
-          </a:xfrm>
-        </p:spPr>
+        <p:spPr/>
         <p:txBody>
           <a:bodyPr/>
           <a:lstStyle/>
           <a:p>
             <a:r>
               <a:rPr lang="en-US" dirty="0"/>
-              <a:t>Creating the Model</a:t>
+              <a:t>Sampled Comments</a:t>
             </a:r>
           </a:p>
         </p:txBody>
@@ -20539,7 +20699,7 @@
           <p:cNvPr id="4" name="Date Placeholder 3">
             <a:extLst>
               <a:ext uri="{FF2B5EF4-FFF2-40B4-BE49-F238E27FC236}">
-                <a16:creationId xmlns:a16="http://schemas.microsoft.com/office/drawing/2014/main" id="{AFA7CBE4-FA82-518B-0A02-7B9E54F62398}"/>
+                <a16:creationId xmlns:a16="http://schemas.microsoft.com/office/drawing/2014/main" id="{89769249-1492-A6AA-8BB7-6CAE401B857E}"/>
               </a:ext>
             </a:extLst>
           </p:cNvPr>
@@ -20568,7 +20728,7 @@
           <p:cNvPr id="5" name="Footer Placeholder 4">
             <a:extLst>
               <a:ext uri="{FF2B5EF4-FFF2-40B4-BE49-F238E27FC236}">
-                <a16:creationId xmlns:a16="http://schemas.microsoft.com/office/drawing/2014/main" id="{AB832FC6-77F0-47C2-CFAF-FF79B68F319D}"/>
+                <a16:creationId xmlns:a16="http://schemas.microsoft.com/office/drawing/2014/main" id="{D2558C11-08B1-3D37-9946-A6F9FD2A2F84}"/>
               </a:ext>
             </a:extLst>
           </p:cNvPr>
@@ -20597,7 +20757,7 @@
           <p:cNvPr id="6" name="Slide Number Placeholder 5">
             <a:extLst>
               <a:ext uri="{FF2B5EF4-FFF2-40B4-BE49-F238E27FC236}">
-                <a16:creationId xmlns:a16="http://schemas.microsoft.com/office/drawing/2014/main" id="{24FDEF54-5C21-2713-7391-EED9F018AA85}"/>
+                <a16:creationId xmlns:a16="http://schemas.microsoft.com/office/drawing/2014/main" id="{4D943DD5-694D-8F56-B6C2-F0FF0EA7D76F}"/>
               </a:ext>
             </a:extLst>
           </p:cNvPr>
@@ -20616,6 +20776,186 @@
             <a:fld id="{B5CEABB6-07DC-46E8-9B57-56EC44A396E5}" type="slidenum">
               <a:rPr lang="en-US" smtClean="0"/>
               <a:t>16</a:t>
+            </a:fld>
+            <a:endParaRPr lang="en-US" dirty="0"/>
+          </a:p>
+        </p:txBody>
+      </p:sp>
+      <p:pic>
+        <p:nvPicPr>
+          <p:cNvPr id="9" name="Picture 8">
+            <a:extLst>
+              <a:ext uri="{FF2B5EF4-FFF2-40B4-BE49-F238E27FC236}">
+                <a16:creationId xmlns:a16="http://schemas.microsoft.com/office/drawing/2014/main" id="{786C800F-9482-8FEB-6311-E0B532E76039}"/>
+              </a:ext>
+            </a:extLst>
+          </p:cNvPr>
+          <p:cNvPicPr>
+            <a:picLocks noChangeAspect="1"/>
+          </p:cNvPicPr>
+          <p:nvPr/>
+        </p:nvPicPr>
+        <p:blipFill>
+          <a:blip r:embed="rId2"/>
+          <a:stretch>
+            <a:fillRect/>
+          </a:stretch>
+        </p:blipFill>
+        <p:spPr>
+          <a:xfrm>
+            <a:off x="2209800" y="1690688"/>
+            <a:ext cx="7113672" cy="4268203"/>
+          </a:xfrm>
+          <a:prstGeom prst="rect">
+            <a:avLst/>
+          </a:prstGeom>
+        </p:spPr>
+      </p:pic>
+    </p:spTree>
+    <p:extLst>
+      <p:ext uri="{BB962C8B-B14F-4D97-AF65-F5344CB8AC3E}">
+        <p14:creationId xmlns:p14="http://schemas.microsoft.com/office/powerpoint/2010/main" val="2952980025"/>
+      </p:ext>
+    </p:extLst>
+  </p:cSld>
+  <p:clrMapOvr>
+    <a:masterClrMapping/>
+  </p:clrMapOvr>
+</p:sld>
+</file>
+
+<file path=ppt/slides/slide17.xml><?xml version="1.0" encoding="utf-8"?>
+<p:sld xmlns:a="http://schemas.openxmlformats.org/drawingml/2006/main" xmlns:r="http://schemas.openxmlformats.org/officeDocument/2006/relationships" xmlns:p="http://schemas.openxmlformats.org/presentationml/2006/main">
+  <p:cSld>
+    <p:spTree>
+      <p:nvGrpSpPr>
+        <p:cNvPr id="1" name=""/>
+        <p:cNvGrpSpPr/>
+        <p:nvPr/>
+      </p:nvGrpSpPr>
+      <p:grpSpPr>
+        <a:xfrm>
+          <a:off x="0" y="0"/>
+          <a:ext cx="0" cy="0"/>
+          <a:chOff x="0" y="0"/>
+          <a:chExt cx="0" cy="0"/>
+        </a:xfrm>
+      </p:grpSpPr>
+      <p:sp>
+        <p:nvSpPr>
+          <p:cNvPr id="2" name="Title 1">
+            <a:extLst>
+              <a:ext uri="{FF2B5EF4-FFF2-40B4-BE49-F238E27FC236}">
+                <a16:creationId xmlns:a16="http://schemas.microsoft.com/office/drawing/2014/main" id="{CF29678D-8F81-E56A-F6A0-8C3C4097DE17}"/>
+              </a:ext>
+            </a:extLst>
+          </p:cNvPr>
+          <p:cNvSpPr>
+            <a:spLocks noGrp="1"/>
+          </p:cNvSpPr>
+          <p:nvPr>
+            <p:ph type="title"/>
+          </p:nvPr>
+        </p:nvSpPr>
+        <p:spPr>
+          <a:xfrm>
+            <a:off x="838200" y="593725"/>
+            <a:ext cx="10515600" cy="658453"/>
+          </a:xfrm>
+        </p:spPr>
+        <p:txBody>
+          <a:bodyPr/>
+          <a:lstStyle/>
+          <a:p>
+            <a:r>
+              <a:rPr lang="en-US" dirty="0"/>
+              <a:t>Creating the Model</a:t>
+            </a:r>
+          </a:p>
+        </p:txBody>
+      </p:sp>
+      <p:sp>
+        <p:nvSpPr>
+          <p:cNvPr id="4" name="Date Placeholder 3">
+            <a:extLst>
+              <a:ext uri="{FF2B5EF4-FFF2-40B4-BE49-F238E27FC236}">
+                <a16:creationId xmlns:a16="http://schemas.microsoft.com/office/drawing/2014/main" id="{AFA7CBE4-FA82-518B-0A02-7B9E54F62398}"/>
+              </a:ext>
+            </a:extLst>
+          </p:cNvPr>
+          <p:cNvSpPr>
+            <a:spLocks noGrp="1"/>
+          </p:cNvSpPr>
+          <p:nvPr>
+            <p:ph type="dt" sz="half" idx="10"/>
+          </p:nvPr>
+        </p:nvSpPr>
+        <p:spPr/>
+        <p:txBody>
+          <a:bodyPr/>
+          <a:lstStyle/>
+          <a:p>
+            <a:r>
+              <a:rPr lang="en-US"/>
+              <a:t>Spring 2022</a:t>
+            </a:r>
+            <a:endParaRPr lang="en-US" dirty="0"/>
+          </a:p>
+        </p:txBody>
+      </p:sp>
+      <p:sp>
+        <p:nvSpPr>
+          <p:cNvPr id="5" name="Footer Placeholder 4">
+            <a:extLst>
+              <a:ext uri="{FF2B5EF4-FFF2-40B4-BE49-F238E27FC236}">
+                <a16:creationId xmlns:a16="http://schemas.microsoft.com/office/drawing/2014/main" id="{AB832FC6-77F0-47C2-CFAF-FF79B68F319D}"/>
+              </a:ext>
+            </a:extLst>
+          </p:cNvPr>
+          <p:cNvSpPr>
+            <a:spLocks noGrp="1"/>
+          </p:cNvSpPr>
+          <p:nvPr>
+            <p:ph type="ftr" sz="quarter" idx="11"/>
+          </p:nvPr>
+        </p:nvSpPr>
+        <p:spPr/>
+        <p:txBody>
+          <a:bodyPr/>
+          <a:lstStyle/>
+          <a:p>
+            <a:r>
+              <a:rPr lang="en-US"/>
+              <a:t>Data Wrangling - Final Project</a:t>
+            </a:r>
+            <a:endParaRPr lang="en-US" dirty="0"/>
+          </a:p>
+        </p:txBody>
+      </p:sp>
+      <p:sp>
+        <p:nvSpPr>
+          <p:cNvPr id="6" name="Slide Number Placeholder 5">
+            <a:extLst>
+              <a:ext uri="{FF2B5EF4-FFF2-40B4-BE49-F238E27FC236}">
+                <a16:creationId xmlns:a16="http://schemas.microsoft.com/office/drawing/2014/main" id="{24FDEF54-5C21-2713-7391-EED9F018AA85}"/>
+              </a:ext>
+            </a:extLst>
+          </p:cNvPr>
+          <p:cNvSpPr>
+            <a:spLocks noGrp="1"/>
+          </p:cNvSpPr>
+          <p:nvPr>
+            <p:ph type="sldNum" sz="quarter" idx="12"/>
+          </p:nvPr>
+        </p:nvSpPr>
+        <p:spPr/>
+        <p:txBody>
+          <a:bodyPr/>
+          <a:lstStyle/>
+          <a:p>
+            <a:fld id="{B5CEABB6-07DC-46E8-9B57-56EC44A396E5}" type="slidenum">
+              <a:rPr lang="en-US" smtClean="0"/>
+              <a:t>17</a:t>
             </a:fld>
             <a:endParaRPr lang="en-US" dirty="0"/>
           </a:p>
@@ -20833,6 +21173,105 @@
         <p:spPr>
           <a:xfrm>
             <a:off x="5478463" y="2428537"/>
+            <a:ext cx="1600117" cy="0"/>
+          </a:xfrm>
+          <a:prstGeom prst="straightConnector1">
+            <a:avLst/>
+          </a:prstGeom>
+          <a:ln w="38100">
+            <a:tailEnd type="triangle"/>
+          </a:ln>
+        </p:spPr>
+        <p:style>
+          <a:lnRef idx="3">
+            <a:schemeClr val="dk1"/>
+          </a:lnRef>
+          <a:fillRef idx="0">
+            <a:schemeClr val="dk1"/>
+          </a:fillRef>
+          <a:effectRef idx="2">
+            <a:schemeClr val="dk1"/>
+          </a:effectRef>
+          <a:fontRef idx="minor">
+            <a:schemeClr val="tx1"/>
+          </a:fontRef>
+        </p:style>
+      </p:cxnSp>
+      <p:pic>
+        <p:nvPicPr>
+          <p:cNvPr id="18" name="Picture 17">
+            <a:extLst>
+              <a:ext uri="{FF2B5EF4-FFF2-40B4-BE49-F238E27FC236}">
+                <a16:creationId xmlns:a16="http://schemas.microsoft.com/office/drawing/2014/main" id="{FFCC0A94-3727-F0C2-6D39-9B125968F4E8}"/>
+              </a:ext>
+            </a:extLst>
+          </p:cNvPr>
+          <p:cNvPicPr>
+            <a:picLocks noChangeAspect="1"/>
+          </p:cNvPicPr>
+          <p:nvPr/>
+        </p:nvPicPr>
+        <p:blipFill>
+          <a:blip r:embed="rId2"/>
+          <a:stretch>
+            <a:fillRect/>
+          </a:stretch>
+        </p:blipFill>
+        <p:spPr>
+          <a:xfrm>
+            <a:off x="2243259" y="4307038"/>
+            <a:ext cx="2674160" cy="1600200"/>
+          </a:xfrm>
+          <a:prstGeom prst="rect">
+            <a:avLst/>
+          </a:prstGeom>
+        </p:spPr>
+      </p:pic>
+      <p:pic>
+        <p:nvPicPr>
+          <p:cNvPr id="19" name="Picture 18">
+            <a:extLst>
+              <a:ext uri="{FF2B5EF4-FFF2-40B4-BE49-F238E27FC236}">
+                <a16:creationId xmlns:a16="http://schemas.microsoft.com/office/drawing/2014/main" id="{12FEC859-6856-4FC6-140D-4364BE719DE5}"/>
+              </a:ext>
+            </a:extLst>
+          </p:cNvPr>
+          <p:cNvPicPr>
+            <a:picLocks noChangeAspect="1"/>
+          </p:cNvPicPr>
+          <p:nvPr/>
+        </p:nvPicPr>
+        <p:blipFill>
+          <a:blip r:embed="rId3"/>
+          <a:stretch>
+            <a:fillRect/>
+          </a:stretch>
+        </p:blipFill>
+        <p:spPr>
+          <a:xfrm>
+            <a:off x="7308040" y="4307038"/>
+            <a:ext cx="2674160" cy="1600200"/>
+          </a:xfrm>
+          <a:prstGeom prst="rect">
+            <a:avLst/>
+          </a:prstGeom>
+        </p:spPr>
+      </p:pic>
+      <p:cxnSp>
+        <p:nvCxnSpPr>
+          <p:cNvPr id="20" name="Straight Arrow Connector 19">
+            <a:extLst>
+              <a:ext uri="{FF2B5EF4-FFF2-40B4-BE49-F238E27FC236}">
+                <a16:creationId xmlns:a16="http://schemas.microsoft.com/office/drawing/2014/main" id="{0DBBC6D9-F4A6-84FD-EBA2-6FFFA70FB4CA}"/>
+              </a:ext>
+            </a:extLst>
+          </p:cNvPr>
+          <p:cNvCxnSpPr/>
+          <p:nvPr/>
+        </p:nvCxnSpPr>
+        <p:spPr>
+          <a:xfrm>
+            <a:off x="5330586" y="5109843"/>
             <a:ext cx="1600117" cy="0"/>
           </a:xfrm>
           <a:prstGeom prst="straightConnector1">
@@ -20870,6 +21309,496 @@
 </p:sld>
 </file>
 
+<file path=ppt/slides/slide18.xml><?xml version="1.0" encoding="utf-8"?>
+<p:sld xmlns:a="http://schemas.openxmlformats.org/drawingml/2006/main" xmlns:r="http://schemas.openxmlformats.org/officeDocument/2006/relationships" xmlns:p="http://schemas.openxmlformats.org/presentationml/2006/main">
+  <p:cSld>
+    <p:spTree>
+      <p:nvGrpSpPr>
+        <p:cNvPr id="1" name=""/>
+        <p:cNvGrpSpPr/>
+        <p:nvPr/>
+      </p:nvGrpSpPr>
+      <p:grpSpPr>
+        <a:xfrm>
+          <a:off x="0" y="0"/>
+          <a:ext cx="0" cy="0"/>
+          <a:chOff x="0" y="0"/>
+          <a:chExt cx="0" cy="0"/>
+        </a:xfrm>
+      </p:grpSpPr>
+      <p:sp>
+        <p:nvSpPr>
+          <p:cNvPr id="4" name="Date Placeholder 3">
+            <a:extLst>
+              <a:ext uri="{FF2B5EF4-FFF2-40B4-BE49-F238E27FC236}">
+                <a16:creationId xmlns:a16="http://schemas.microsoft.com/office/drawing/2014/main" id="{7887DCAC-6583-4AE1-005D-CAC40F94DF36}"/>
+              </a:ext>
+            </a:extLst>
+          </p:cNvPr>
+          <p:cNvSpPr>
+            <a:spLocks noGrp="1"/>
+          </p:cNvSpPr>
+          <p:nvPr>
+            <p:ph type="dt" sz="half" idx="10"/>
+          </p:nvPr>
+        </p:nvSpPr>
+        <p:spPr/>
+        <p:txBody>
+          <a:bodyPr/>
+          <a:lstStyle/>
+          <a:p>
+            <a:r>
+              <a:rPr lang="en-US"/>
+              <a:t>Spring 2022</a:t>
+            </a:r>
+            <a:endParaRPr lang="en-US" dirty="0"/>
+          </a:p>
+        </p:txBody>
+      </p:sp>
+      <p:sp>
+        <p:nvSpPr>
+          <p:cNvPr id="5" name="Footer Placeholder 4">
+            <a:extLst>
+              <a:ext uri="{FF2B5EF4-FFF2-40B4-BE49-F238E27FC236}">
+                <a16:creationId xmlns:a16="http://schemas.microsoft.com/office/drawing/2014/main" id="{7638532D-6D0D-2C29-7FB3-3EA4ECABF1D4}"/>
+              </a:ext>
+            </a:extLst>
+          </p:cNvPr>
+          <p:cNvSpPr>
+            <a:spLocks noGrp="1"/>
+          </p:cNvSpPr>
+          <p:nvPr>
+            <p:ph type="ftr" sz="quarter" idx="11"/>
+          </p:nvPr>
+        </p:nvSpPr>
+        <p:spPr/>
+        <p:txBody>
+          <a:bodyPr/>
+          <a:lstStyle/>
+          <a:p>
+            <a:r>
+              <a:rPr lang="en-US"/>
+              <a:t>Data Wrangling - Final Project</a:t>
+            </a:r>
+            <a:endParaRPr lang="en-US" dirty="0"/>
+          </a:p>
+        </p:txBody>
+      </p:sp>
+      <p:sp>
+        <p:nvSpPr>
+          <p:cNvPr id="6" name="Slide Number Placeholder 5">
+            <a:extLst>
+              <a:ext uri="{FF2B5EF4-FFF2-40B4-BE49-F238E27FC236}">
+                <a16:creationId xmlns:a16="http://schemas.microsoft.com/office/drawing/2014/main" id="{2C4DECCF-3AFC-4A04-65B1-4E1BDF95577C}"/>
+              </a:ext>
+            </a:extLst>
+          </p:cNvPr>
+          <p:cNvSpPr>
+            <a:spLocks noGrp="1"/>
+          </p:cNvSpPr>
+          <p:nvPr>
+            <p:ph type="sldNum" sz="quarter" idx="12"/>
+          </p:nvPr>
+        </p:nvSpPr>
+        <p:spPr/>
+        <p:txBody>
+          <a:bodyPr/>
+          <a:lstStyle/>
+          <a:p>
+            <a:fld id="{B5CEABB6-07DC-46E8-9B57-56EC44A396E5}" type="slidenum">
+              <a:rPr lang="en-US" smtClean="0"/>
+              <a:t>18</a:t>
+            </a:fld>
+            <a:endParaRPr lang="en-US" dirty="0"/>
+          </a:p>
+        </p:txBody>
+      </p:sp>
+      <p:pic>
+        <p:nvPicPr>
+          <p:cNvPr id="7" name="Picture 6">
+            <a:extLst>
+              <a:ext uri="{FF2B5EF4-FFF2-40B4-BE49-F238E27FC236}">
+                <a16:creationId xmlns:a16="http://schemas.microsoft.com/office/drawing/2014/main" id="{F93A57BB-2B3D-7F5D-3CB6-A444E0E0125F}"/>
+              </a:ext>
+            </a:extLst>
+          </p:cNvPr>
+          <p:cNvPicPr>
+            <a:picLocks noChangeAspect="1"/>
+          </p:cNvPicPr>
+          <p:nvPr/>
+        </p:nvPicPr>
+        <p:blipFill>
+          <a:blip r:embed="rId2"/>
+          <a:stretch>
+            <a:fillRect/>
+          </a:stretch>
+        </p:blipFill>
+        <p:spPr>
+          <a:xfrm>
+            <a:off x="2085359" y="1804737"/>
+            <a:ext cx="8021282" cy="2636253"/>
+          </a:xfrm>
+          <a:prstGeom prst="rect">
+            <a:avLst/>
+          </a:prstGeom>
+        </p:spPr>
+      </p:pic>
+      <p:sp>
+        <p:nvSpPr>
+          <p:cNvPr id="8" name="TextBox 7">
+            <a:extLst>
+              <a:ext uri="{FF2B5EF4-FFF2-40B4-BE49-F238E27FC236}">
+                <a16:creationId xmlns:a16="http://schemas.microsoft.com/office/drawing/2014/main" id="{C26B1FFC-8385-6112-EA5D-C783231BD25B}"/>
+              </a:ext>
+            </a:extLst>
+          </p:cNvPr>
+          <p:cNvSpPr txBox="1"/>
+          <p:nvPr/>
+        </p:nvSpPr>
+        <p:spPr>
+          <a:xfrm>
+            <a:off x="182479" y="5734583"/>
+            <a:ext cx="11827041" cy="523220"/>
+          </a:xfrm>
+          <a:prstGeom prst="rect">
+            <a:avLst/>
+          </a:prstGeom>
+          <a:noFill/>
+        </p:spPr>
+        <p:txBody>
+          <a:bodyPr wrap="square" rtlCol="0">
+            <a:spAutoFit/>
+          </a:bodyPr>
+          <a:lstStyle/>
+          <a:p>
+            <a:r>
+              <a:rPr lang="en-US" sz="1400" b="1" dirty="0"/>
+              <a:t>Note</a:t>
+            </a:r>
+            <a:r>
+              <a:rPr lang="en-US" sz="1400" dirty="0"/>
+              <a:t>: Data used for the model was one where the sentiment of the comment and the popularity of its parent were aligned. This was, in part, because</a:t>
+            </a:r>
+          </a:p>
+          <a:p>
+            <a:r>
+              <a:rPr lang="en-US" sz="1400" dirty="0"/>
+              <a:t>          using the entire pool of comments yielded a useless model, though this choice is also theoretically justified.</a:t>
+            </a:r>
+          </a:p>
+        </p:txBody>
+      </p:sp>
+    </p:spTree>
+    <p:extLst>
+      <p:ext uri="{BB962C8B-B14F-4D97-AF65-F5344CB8AC3E}">
+        <p14:creationId xmlns:p14="http://schemas.microsoft.com/office/powerpoint/2010/main" val="3905807002"/>
+      </p:ext>
+    </p:extLst>
+  </p:cSld>
+  <p:clrMapOvr>
+    <a:masterClrMapping/>
+  </p:clrMapOvr>
+</p:sld>
+</file>
+
+<file path=ppt/slides/slide19.xml><?xml version="1.0" encoding="utf-8"?>
+<p:sld xmlns:a="http://schemas.openxmlformats.org/drawingml/2006/main" xmlns:r="http://schemas.openxmlformats.org/officeDocument/2006/relationships" xmlns:p="http://schemas.openxmlformats.org/presentationml/2006/main">
+  <p:cSld>
+    <p:spTree>
+      <p:nvGrpSpPr>
+        <p:cNvPr id="1" name=""/>
+        <p:cNvGrpSpPr/>
+        <p:nvPr/>
+      </p:nvGrpSpPr>
+      <p:grpSpPr>
+        <a:xfrm>
+          <a:off x="0" y="0"/>
+          <a:ext cx="0" cy="0"/>
+          <a:chOff x="0" y="0"/>
+          <a:chExt cx="0" cy="0"/>
+        </a:xfrm>
+      </p:grpSpPr>
+      <p:sp>
+        <p:nvSpPr>
+          <p:cNvPr id="7" name="Title 6">
+            <a:extLst>
+              <a:ext uri="{FF2B5EF4-FFF2-40B4-BE49-F238E27FC236}">
+                <a16:creationId xmlns:a16="http://schemas.microsoft.com/office/drawing/2014/main" id="{799D371A-4AD5-F40F-2C2B-3DE32E98808E}"/>
+              </a:ext>
+            </a:extLst>
+          </p:cNvPr>
+          <p:cNvSpPr>
+            <a:spLocks noGrp="1"/>
+          </p:cNvSpPr>
+          <p:nvPr>
+            <p:ph type="title"/>
+          </p:nvPr>
+        </p:nvSpPr>
+        <p:spPr/>
+        <p:txBody>
+          <a:bodyPr/>
+          <a:lstStyle/>
+          <a:p>
+            <a:r>
+              <a:rPr lang="en-US" dirty="0"/>
+              <a:t>Case Study Takeaways</a:t>
+            </a:r>
+          </a:p>
+        </p:txBody>
+      </p:sp>
+      <p:sp>
+        <p:nvSpPr>
+          <p:cNvPr id="4" name="Date Placeholder 3">
+            <a:extLst>
+              <a:ext uri="{FF2B5EF4-FFF2-40B4-BE49-F238E27FC236}">
+                <a16:creationId xmlns:a16="http://schemas.microsoft.com/office/drawing/2014/main" id="{17209523-06AB-EDB3-6538-E6F0E0B075AA}"/>
+              </a:ext>
+            </a:extLst>
+          </p:cNvPr>
+          <p:cNvSpPr>
+            <a:spLocks noGrp="1"/>
+          </p:cNvSpPr>
+          <p:nvPr>
+            <p:ph type="dt" sz="half" idx="10"/>
+          </p:nvPr>
+        </p:nvSpPr>
+        <p:spPr/>
+        <p:txBody>
+          <a:bodyPr/>
+          <a:lstStyle/>
+          <a:p>
+            <a:r>
+              <a:rPr lang="en-US"/>
+              <a:t>Spring 2022</a:t>
+            </a:r>
+            <a:endParaRPr lang="en-US" dirty="0"/>
+          </a:p>
+        </p:txBody>
+      </p:sp>
+      <p:sp>
+        <p:nvSpPr>
+          <p:cNvPr id="5" name="Footer Placeholder 4">
+            <a:extLst>
+              <a:ext uri="{FF2B5EF4-FFF2-40B4-BE49-F238E27FC236}">
+                <a16:creationId xmlns:a16="http://schemas.microsoft.com/office/drawing/2014/main" id="{7C2DEDFD-2C4B-63E1-0B8F-0DE44D347C91}"/>
+              </a:ext>
+            </a:extLst>
+          </p:cNvPr>
+          <p:cNvSpPr>
+            <a:spLocks noGrp="1"/>
+          </p:cNvSpPr>
+          <p:nvPr>
+            <p:ph type="ftr" sz="quarter" idx="11"/>
+          </p:nvPr>
+        </p:nvSpPr>
+        <p:spPr/>
+        <p:txBody>
+          <a:bodyPr/>
+          <a:lstStyle/>
+          <a:p>
+            <a:r>
+              <a:rPr lang="en-US"/>
+              <a:t>Data Wrangling - Final Project</a:t>
+            </a:r>
+            <a:endParaRPr lang="en-US" dirty="0"/>
+          </a:p>
+        </p:txBody>
+      </p:sp>
+      <p:sp>
+        <p:nvSpPr>
+          <p:cNvPr id="6" name="Slide Number Placeholder 5">
+            <a:extLst>
+              <a:ext uri="{FF2B5EF4-FFF2-40B4-BE49-F238E27FC236}">
+                <a16:creationId xmlns:a16="http://schemas.microsoft.com/office/drawing/2014/main" id="{B42272A4-5B6B-941D-22A5-D85C15F284F1}"/>
+              </a:ext>
+            </a:extLst>
+          </p:cNvPr>
+          <p:cNvSpPr>
+            <a:spLocks noGrp="1"/>
+          </p:cNvSpPr>
+          <p:nvPr>
+            <p:ph type="sldNum" sz="quarter" idx="12"/>
+          </p:nvPr>
+        </p:nvSpPr>
+        <p:spPr/>
+        <p:txBody>
+          <a:bodyPr/>
+          <a:lstStyle/>
+          <a:p>
+            <a:fld id="{B5CEABB6-07DC-46E8-9B57-56EC44A396E5}" type="slidenum">
+              <a:rPr lang="en-US" smtClean="0"/>
+              <a:t>19</a:t>
+            </a:fld>
+            <a:endParaRPr lang="en-US" dirty="0"/>
+          </a:p>
+        </p:txBody>
+      </p:sp>
+      <p:sp>
+        <p:nvSpPr>
+          <p:cNvPr id="13" name="TextBox 12">
+            <a:extLst>
+              <a:ext uri="{FF2B5EF4-FFF2-40B4-BE49-F238E27FC236}">
+                <a16:creationId xmlns:a16="http://schemas.microsoft.com/office/drawing/2014/main" id="{3EE1D751-4D77-0BB1-D33D-4CFCD17CB653}"/>
+              </a:ext>
+            </a:extLst>
+          </p:cNvPr>
+          <p:cNvSpPr txBox="1"/>
+          <p:nvPr/>
+        </p:nvSpPr>
+        <p:spPr>
+          <a:xfrm>
+            <a:off x="838200" y="1656112"/>
+            <a:ext cx="10515600" cy="3693319"/>
+          </a:xfrm>
+          <a:prstGeom prst="rect">
+            <a:avLst/>
+          </a:prstGeom>
+          <a:noFill/>
+        </p:spPr>
+        <p:txBody>
+          <a:bodyPr wrap="square" rtlCol="0">
+            <a:spAutoFit/>
+          </a:bodyPr>
+          <a:lstStyle/>
+          <a:p>
+            <a:r>
+              <a:rPr lang="en-US" dirty="0"/>
+              <a:t>Popularity of parent post is a big indicator of a post’s potential to become popular.</a:t>
+            </a:r>
+          </a:p>
+          <a:p>
+            <a:r>
+              <a:rPr lang="en-US" dirty="0">
+                <a:solidFill>
+                  <a:schemeClr val="tx2"/>
+                </a:solidFill>
+              </a:rPr>
+              <a:t>	</a:t>
+            </a:r>
+            <a:r>
+              <a:rPr lang="en-US" i="1" dirty="0">
+                <a:solidFill>
+                  <a:schemeClr val="tx2"/>
+                </a:solidFill>
+              </a:rPr>
+              <a:t>High coefficient for parent popularity in linear model</a:t>
+            </a:r>
+          </a:p>
+          <a:p>
+            <a:r>
+              <a:rPr lang="en-US" i="1" dirty="0"/>
+              <a:t>	</a:t>
+            </a:r>
+            <a:r>
+              <a:rPr lang="en-US" dirty="0"/>
+              <a:t>Makes sense to us – commenting on an unpopular post doesn’t give you traction</a:t>
+            </a:r>
+          </a:p>
+          <a:p>
+            <a:r>
+              <a:rPr lang="en-US" i="1" dirty="0"/>
+              <a:t>			 </a:t>
+            </a:r>
+            <a:r>
+              <a:rPr lang="en-US" dirty="0"/>
+              <a:t>- harder to ‘go viral’ from a lower-visibility starting point</a:t>
+            </a:r>
+          </a:p>
+          <a:p>
+            <a:endParaRPr lang="en-US" dirty="0"/>
+          </a:p>
+          <a:p>
+            <a:r>
+              <a:rPr lang="en-US" dirty="0"/>
+              <a:t>Unpopular posts lend themselves to more unpopular comment sections.</a:t>
+            </a:r>
+          </a:p>
+          <a:p>
+            <a:r>
+              <a:rPr lang="en-US" dirty="0"/>
+              <a:t>	</a:t>
+            </a:r>
+            <a:r>
+              <a:rPr lang="en-US" i="1" dirty="0">
+                <a:solidFill>
+                  <a:schemeClr val="tx2"/>
+                </a:solidFill>
+              </a:rPr>
+              <a:t>Negative coefficient for parent sentiment in linear model</a:t>
+            </a:r>
+          </a:p>
+          <a:p>
+            <a:r>
+              <a:rPr lang="en-US" i="1" dirty="0"/>
+              <a:t>	</a:t>
+            </a:r>
+            <a:r>
+              <a:rPr lang="en-US" dirty="0"/>
+              <a:t>Makes sense to us – more opportunities for a ‘clap back,’ opportunity to defend your belief</a:t>
+            </a:r>
+          </a:p>
+          <a:p>
+            <a:r>
+              <a:rPr lang="en-US" i="1" dirty="0"/>
+              <a:t>			 </a:t>
+            </a:r>
+            <a:r>
+              <a:rPr lang="en-US" dirty="0"/>
+              <a:t>- interesting relationship with social media algorithms &amp; negativity bias</a:t>
+            </a:r>
+          </a:p>
+          <a:p>
+            <a:endParaRPr lang="en-US" dirty="0"/>
+          </a:p>
+          <a:p>
+            <a:r>
+              <a:rPr lang="en-US" dirty="0"/>
+              <a:t>The sentiment of a post seems to be less important than the sentiment of the post it responds to.</a:t>
+            </a:r>
+          </a:p>
+          <a:p>
+            <a:r>
+              <a:rPr lang="en-US" dirty="0">
+                <a:solidFill>
+                  <a:schemeClr val="tx2"/>
+                </a:solidFill>
+              </a:rPr>
+              <a:t>	</a:t>
+            </a:r>
+            <a:r>
+              <a:rPr lang="en-US" i="1" dirty="0">
+                <a:solidFill>
+                  <a:schemeClr val="tx2"/>
+                </a:solidFill>
+              </a:rPr>
+              <a:t>Minute coefficient for post sentiment in linear model, little significance</a:t>
+            </a:r>
+          </a:p>
+          <a:p>
+            <a:r>
+              <a:rPr lang="en-US" i="1" dirty="0"/>
+              <a:t>	</a:t>
+            </a:r>
+            <a:r>
+              <a:rPr lang="en-US" dirty="0"/>
+              <a:t>More important seems to be the (mis)match in sentiment from parent and response</a:t>
+            </a:r>
+          </a:p>
+        </p:txBody>
+      </p:sp>
+    </p:spTree>
+    <p:extLst>
+      <p:ext uri="{BB962C8B-B14F-4D97-AF65-F5344CB8AC3E}">
+        <p14:creationId xmlns:p14="http://schemas.microsoft.com/office/powerpoint/2010/main" val="2882313778"/>
+      </p:ext>
+    </p:extLst>
+  </p:cSld>
+  <p:clrMapOvr>
+    <a:masterClrMapping/>
+  </p:clrMapOvr>
+</p:sld>
+</file>
+
 <file path=ppt/slides/slide2.xml><?xml version="1.0" encoding="utf-8"?>
 <p:sld xmlns:a="http://schemas.openxmlformats.org/drawingml/2006/main" xmlns:r="http://schemas.openxmlformats.org/officeDocument/2006/relationships" xmlns:p="http://schemas.openxmlformats.org/presentationml/2006/main">
   <p:cSld>
@@ -20972,6 +21901,1847 @@
     <p:extLst>
       <p:ext uri="{BB962C8B-B14F-4D97-AF65-F5344CB8AC3E}">
         <p14:creationId xmlns:p14="http://schemas.microsoft.com/office/powerpoint/2010/main" val="1777638861"/>
+      </p:ext>
+    </p:extLst>
+  </p:cSld>
+  <p:clrMapOvr>
+    <a:masterClrMapping/>
+  </p:clrMapOvr>
+</p:sld>
+</file>
+
+<file path=ppt/slides/slide20.xml><?xml version="1.0" encoding="utf-8"?>
+<p:sld xmlns:a="http://schemas.openxmlformats.org/drawingml/2006/main" xmlns:r="http://schemas.openxmlformats.org/officeDocument/2006/relationships" xmlns:p="http://schemas.openxmlformats.org/presentationml/2006/main">
+  <p:cSld>
+    <p:spTree>
+      <p:nvGrpSpPr>
+        <p:cNvPr id="1" name=""/>
+        <p:cNvGrpSpPr/>
+        <p:nvPr/>
+      </p:nvGrpSpPr>
+      <p:grpSpPr>
+        <a:xfrm>
+          <a:off x="0" y="0"/>
+          <a:ext cx="0" cy="0"/>
+          <a:chOff x="0" y="0"/>
+          <a:chExt cx="0" cy="0"/>
+        </a:xfrm>
+      </p:grpSpPr>
+      <p:sp>
+        <p:nvSpPr>
+          <p:cNvPr id="7" name="Title 6">
+            <a:extLst>
+              <a:ext uri="{FF2B5EF4-FFF2-40B4-BE49-F238E27FC236}">
+                <a16:creationId xmlns:a16="http://schemas.microsoft.com/office/drawing/2014/main" id="{799D371A-4AD5-F40F-2C2B-3DE32E98808E}"/>
+              </a:ext>
+            </a:extLst>
+          </p:cNvPr>
+          <p:cNvSpPr>
+            <a:spLocks noGrp="1"/>
+          </p:cNvSpPr>
+          <p:nvPr>
+            <p:ph type="title"/>
+          </p:nvPr>
+        </p:nvSpPr>
+        <p:spPr/>
+        <p:txBody>
+          <a:bodyPr/>
+          <a:lstStyle/>
+          <a:p>
+            <a:r>
+              <a:rPr lang="en-US" dirty="0"/>
+              <a:t>Case Study Limitations</a:t>
+            </a:r>
+          </a:p>
+        </p:txBody>
+      </p:sp>
+      <p:sp>
+        <p:nvSpPr>
+          <p:cNvPr id="4" name="Date Placeholder 3">
+            <a:extLst>
+              <a:ext uri="{FF2B5EF4-FFF2-40B4-BE49-F238E27FC236}">
+                <a16:creationId xmlns:a16="http://schemas.microsoft.com/office/drawing/2014/main" id="{17209523-06AB-EDB3-6538-E6F0E0B075AA}"/>
+              </a:ext>
+            </a:extLst>
+          </p:cNvPr>
+          <p:cNvSpPr>
+            <a:spLocks noGrp="1"/>
+          </p:cNvSpPr>
+          <p:nvPr>
+            <p:ph type="dt" sz="half" idx="10"/>
+          </p:nvPr>
+        </p:nvSpPr>
+        <p:spPr/>
+        <p:txBody>
+          <a:bodyPr/>
+          <a:lstStyle/>
+          <a:p>
+            <a:r>
+              <a:rPr lang="en-US"/>
+              <a:t>Spring 2022</a:t>
+            </a:r>
+            <a:endParaRPr lang="en-US" dirty="0"/>
+          </a:p>
+        </p:txBody>
+      </p:sp>
+      <p:sp>
+        <p:nvSpPr>
+          <p:cNvPr id="5" name="Footer Placeholder 4">
+            <a:extLst>
+              <a:ext uri="{FF2B5EF4-FFF2-40B4-BE49-F238E27FC236}">
+                <a16:creationId xmlns:a16="http://schemas.microsoft.com/office/drawing/2014/main" id="{7C2DEDFD-2C4B-63E1-0B8F-0DE44D347C91}"/>
+              </a:ext>
+            </a:extLst>
+          </p:cNvPr>
+          <p:cNvSpPr>
+            <a:spLocks noGrp="1"/>
+          </p:cNvSpPr>
+          <p:nvPr>
+            <p:ph type="ftr" sz="quarter" idx="11"/>
+          </p:nvPr>
+        </p:nvSpPr>
+        <p:spPr/>
+        <p:txBody>
+          <a:bodyPr/>
+          <a:lstStyle/>
+          <a:p>
+            <a:r>
+              <a:rPr lang="en-US" dirty="0"/>
+              <a:t>Data Wrangling - Final Project</a:t>
+            </a:r>
+          </a:p>
+        </p:txBody>
+      </p:sp>
+      <p:sp>
+        <p:nvSpPr>
+          <p:cNvPr id="6" name="Slide Number Placeholder 5">
+            <a:extLst>
+              <a:ext uri="{FF2B5EF4-FFF2-40B4-BE49-F238E27FC236}">
+                <a16:creationId xmlns:a16="http://schemas.microsoft.com/office/drawing/2014/main" id="{B42272A4-5B6B-941D-22A5-D85C15F284F1}"/>
+              </a:ext>
+            </a:extLst>
+          </p:cNvPr>
+          <p:cNvSpPr>
+            <a:spLocks noGrp="1"/>
+          </p:cNvSpPr>
+          <p:nvPr>
+            <p:ph type="sldNum" sz="quarter" idx="12"/>
+          </p:nvPr>
+        </p:nvSpPr>
+        <p:spPr/>
+        <p:txBody>
+          <a:bodyPr/>
+          <a:lstStyle/>
+          <a:p>
+            <a:fld id="{B5CEABB6-07DC-46E8-9B57-56EC44A396E5}" type="slidenum">
+              <a:rPr lang="en-US" smtClean="0"/>
+              <a:t>20</a:t>
+            </a:fld>
+            <a:endParaRPr lang="en-US" dirty="0"/>
+          </a:p>
+        </p:txBody>
+      </p:sp>
+      <p:sp>
+        <p:nvSpPr>
+          <p:cNvPr id="13" name="TextBox 12">
+            <a:extLst>
+              <a:ext uri="{FF2B5EF4-FFF2-40B4-BE49-F238E27FC236}">
+                <a16:creationId xmlns:a16="http://schemas.microsoft.com/office/drawing/2014/main" id="{3EE1D751-4D77-0BB1-D33D-4CFCD17CB653}"/>
+              </a:ext>
+            </a:extLst>
+          </p:cNvPr>
+          <p:cNvSpPr txBox="1"/>
+          <p:nvPr/>
+        </p:nvSpPr>
+        <p:spPr>
+          <a:xfrm>
+            <a:off x="838200" y="1656112"/>
+            <a:ext cx="5390147" cy="4247317"/>
+          </a:xfrm>
+          <a:prstGeom prst="rect">
+            <a:avLst/>
+          </a:prstGeom>
+          <a:noFill/>
+        </p:spPr>
+        <p:txBody>
+          <a:bodyPr wrap="square" rtlCol="0">
+            <a:spAutoFit/>
+          </a:bodyPr>
+          <a:lstStyle/>
+          <a:p>
+            <a:r>
+              <a:rPr lang="en-US" dirty="0"/>
+              <a:t>Length of posts versus words contained in lexicons </a:t>
+            </a:r>
+          </a:p>
+          <a:p>
+            <a:r>
+              <a:rPr lang="en-US" dirty="0"/>
+              <a:t>	roughly 10% of words are classified</a:t>
+            </a:r>
+          </a:p>
+          <a:p>
+            <a:r>
+              <a:rPr lang="en-US" dirty="0"/>
+              <a:t>	most comments are already short</a:t>
+            </a:r>
+          </a:p>
+          <a:p>
+            <a:endParaRPr lang="en-US" dirty="0"/>
+          </a:p>
+          <a:p>
+            <a:r>
+              <a:rPr lang="en-US" dirty="0"/>
+              <a:t>	</a:t>
+            </a:r>
+            <a:r>
+              <a:rPr lang="en-US" i="1" dirty="0"/>
+              <a:t>look at sentiment score per word?</a:t>
+            </a:r>
+            <a:endParaRPr lang="en-US" dirty="0"/>
+          </a:p>
+          <a:p>
+            <a:r>
+              <a:rPr lang="en-US" dirty="0"/>
+              <a:t>	</a:t>
+            </a:r>
+          </a:p>
+          <a:p>
+            <a:r>
+              <a:rPr lang="en-US" dirty="0"/>
+              <a:t>Lack of posts with unpopular parents</a:t>
+            </a:r>
+          </a:p>
+          <a:p>
+            <a:r>
+              <a:rPr lang="en-US" dirty="0"/>
+              <a:t>	functionally, only EA’s post filled this role</a:t>
+            </a:r>
+          </a:p>
+          <a:p>
+            <a:r>
+              <a:rPr lang="en-US" dirty="0"/>
+              <a:t>	difficult to distinguish between negative </a:t>
+            </a:r>
+          </a:p>
+          <a:p>
+            <a:r>
+              <a:rPr lang="en-US" dirty="0"/>
+              <a:t>	parent and depth in thread</a:t>
+            </a:r>
+          </a:p>
+          <a:p>
+            <a:endParaRPr lang="en-US" dirty="0"/>
+          </a:p>
+          <a:p>
+            <a:endParaRPr lang="en-US" dirty="0"/>
+          </a:p>
+          <a:p>
+            <a:r>
+              <a:rPr lang="en-US" dirty="0"/>
+              <a:t>SARCASM! </a:t>
+            </a:r>
+          </a:p>
+          <a:p>
+            <a:r>
+              <a:rPr lang="en-US" dirty="0"/>
+              <a:t>	</a:t>
+            </a:r>
+            <a:r>
+              <a:rPr lang="en-US" i="1" dirty="0"/>
+              <a:t>look at a score of </a:t>
+            </a:r>
+            <a:r>
+              <a:rPr lang="en-US" i="1" dirty="0" err="1"/>
+              <a:t>pos+neg</a:t>
+            </a:r>
+            <a:r>
+              <a:rPr lang="en-US" i="1" dirty="0"/>
+              <a:t> = passion?</a:t>
+            </a:r>
+            <a:endParaRPr lang="en-US" dirty="0"/>
+          </a:p>
+          <a:p>
+            <a:endParaRPr lang="en-US" dirty="0"/>
+          </a:p>
+        </p:txBody>
+      </p:sp>
+      <p:pic>
+        <p:nvPicPr>
+          <p:cNvPr id="8" name="Picture 7">
+            <a:extLst>
+              <a:ext uri="{FF2B5EF4-FFF2-40B4-BE49-F238E27FC236}">
+                <a16:creationId xmlns:a16="http://schemas.microsoft.com/office/drawing/2014/main" id="{263116AE-9DB9-EFA5-6DB8-E1E77471FC46}"/>
+              </a:ext>
+            </a:extLst>
+          </p:cNvPr>
+          <p:cNvPicPr>
+            <a:picLocks noChangeAspect="1"/>
+          </p:cNvPicPr>
+          <p:nvPr/>
+        </p:nvPicPr>
+        <p:blipFill>
+          <a:blip r:embed="rId3"/>
+          <a:stretch>
+            <a:fillRect/>
+          </a:stretch>
+        </p:blipFill>
+        <p:spPr>
+          <a:xfrm>
+            <a:off x="6312568" y="2971800"/>
+            <a:ext cx="4544698" cy="2726819"/>
+          </a:xfrm>
+          <a:prstGeom prst="rect">
+            <a:avLst/>
+          </a:prstGeom>
+        </p:spPr>
+      </p:pic>
+      <p:sp>
+        <p:nvSpPr>
+          <p:cNvPr id="2" name="Oval 1">
+            <a:extLst>
+              <a:ext uri="{FF2B5EF4-FFF2-40B4-BE49-F238E27FC236}">
+                <a16:creationId xmlns:a16="http://schemas.microsoft.com/office/drawing/2014/main" id="{B8EBDC64-F748-5D57-6579-F3BBE78F5C49}"/>
+              </a:ext>
+            </a:extLst>
+          </p:cNvPr>
+          <p:cNvSpPr/>
+          <p:nvPr/>
+        </p:nvSpPr>
+        <p:spPr>
+          <a:xfrm>
+            <a:off x="10527630" y="3230477"/>
+            <a:ext cx="281508" cy="276726"/>
+          </a:xfrm>
+          <a:prstGeom prst="ellipse">
+            <a:avLst/>
+          </a:prstGeom>
+          <a:noFill/>
+        </p:spPr>
+        <p:style>
+          <a:lnRef idx="2">
+            <a:schemeClr val="accent5"/>
+          </a:lnRef>
+          <a:fillRef idx="1">
+            <a:schemeClr val="lt1"/>
+          </a:fillRef>
+          <a:effectRef idx="0">
+            <a:schemeClr val="accent5"/>
+          </a:effectRef>
+          <a:fontRef idx="minor">
+            <a:schemeClr val="dk1"/>
+          </a:fontRef>
+        </p:style>
+        <p:txBody>
+          <a:bodyPr rtlCol="0" anchor="ctr"/>
+          <a:lstStyle/>
+          <a:p>
+            <a:pPr algn="ctr"/>
+            <a:endParaRPr lang="en-US"/>
+          </a:p>
+        </p:txBody>
+      </p:sp>
+      <p:sp>
+        <p:nvSpPr>
+          <p:cNvPr id="15" name="Rectangle 1">
+            <a:extLst>
+              <a:ext uri="{FF2B5EF4-FFF2-40B4-BE49-F238E27FC236}">
+                <a16:creationId xmlns:a16="http://schemas.microsoft.com/office/drawing/2014/main" id="{17527C4C-AF8F-5D4F-E76D-FED2E485CE9F}"/>
+              </a:ext>
+            </a:extLst>
+          </p:cNvPr>
+          <p:cNvSpPr>
+            <a:spLocks noChangeArrowheads="1"/>
+          </p:cNvSpPr>
+          <p:nvPr/>
+        </p:nvSpPr>
+        <p:spPr bwMode="auto">
+          <a:xfrm>
+            <a:off x="838200" y="3794125"/>
+            <a:ext cx="12192000" cy="0"/>
+          </a:xfrm>
+          <a:prstGeom prst="rect">
+            <a:avLst/>
+          </a:prstGeom>
+          <a:noFill/>
+          <a:ln>
+            <a:noFill/>
+          </a:ln>
+          <a:effectLst/>
+          <a:extLst>
+            <a:ext uri="{909E8E84-426E-40DD-AFC4-6F175D3DCCD1}">
+              <a14:hiddenFill xmlns:a14="http://schemas.microsoft.com/office/drawing/2010/main">
+                <a:solidFill>
+                  <a:schemeClr val="accent1"/>
+                </a:solidFill>
+              </a14:hiddenFill>
+            </a:ext>
+            <a:ext uri="{91240B29-F687-4F45-9708-019B960494DF}">
+              <a14:hiddenLine xmlns:a14="http://schemas.microsoft.com/office/drawing/2010/main" w="9525">
+                <a:solidFill>
+                  <a:schemeClr val="tx1"/>
+                </a:solidFill>
+                <a:miter lim="800000"/>
+                <a:headEnd/>
+                <a:tailEnd/>
+              </a14:hiddenLine>
+            </a:ext>
+            <a:ext uri="{AF507438-7753-43E0-B8FC-AC1667EBCBE1}">
+              <a14:hiddenEffects xmlns:a14="http://schemas.microsoft.com/office/drawing/2010/main">
+                <a:effectLst>
+                  <a:outerShdw dist="35921" dir="2700000" algn="ctr" rotWithShape="0">
+                    <a:schemeClr val="bg2"/>
+                  </a:outerShdw>
+                </a:effectLst>
+              </a14:hiddenEffects>
+            </a:ext>
+          </a:extLst>
+        </p:spPr>
+        <p:txBody>
+          <a:bodyPr vert="horz" wrap="none" lIns="91440" tIns="45720" rIns="91440" bIns="45720" numCol="1" anchor="ctr" anchorCtr="0" compatLnSpc="1">
+            <a:prstTxWarp prst="textNoShape">
+              <a:avLst/>
+            </a:prstTxWarp>
+            <a:spAutoFit/>
+          </a:bodyPr>
+          <a:lstStyle/>
+          <a:p>
+            <a:pPr marL="0" marR="0" lvl="0" indent="0" algn="l" defTabSz="914400" rtl="0" eaLnBrk="0" fontAlgn="base" latinLnBrk="0" hangingPunct="0">
+              <a:lnSpc>
+                <a:spcPct val="100000"/>
+              </a:lnSpc>
+              <a:spcBef>
+                <a:spcPct val="0"/>
+              </a:spcBef>
+              <a:spcAft>
+                <a:spcPct val="0"/>
+              </a:spcAft>
+              <a:buClrTx/>
+              <a:buSzTx/>
+              <a:buFontTx/>
+              <a:buNone/>
+              <a:tabLst/>
+            </a:pPr>
+            <a:br>
+              <a:rPr kumimoji="0" lang="en-US" altLang="en-US" sz="1800" b="0" i="0" u="none" strike="noStrike" cap="none" normalizeH="0" baseline="0">
+                <a:ln>
+                  <a:noFill/>
+                </a:ln>
+                <a:solidFill>
+                  <a:schemeClr val="tx1"/>
+                </a:solidFill>
+                <a:effectLst/>
+                <a:latin typeface="Arial" panose="020B0604020202020204" pitchFamily="34" charset="0"/>
+              </a:rPr>
+            </a:br>
+            <a:endParaRPr kumimoji="0" lang="en-US" altLang="en-US" sz="1800" b="0" i="0" u="none" strike="noStrike" cap="none" normalizeH="0" baseline="0">
+              <a:ln>
+                <a:noFill/>
+              </a:ln>
+              <a:solidFill>
+                <a:schemeClr val="tx1"/>
+              </a:solidFill>
+              <a:effectLst/>
+              <a:latin typeface="Arial" panose="020B0604020202020204" pitchFamily="34" charset="0"/>
+            </a:endParaRPr>
+          </a:p>
+        </p:txBody>
+      </p:sp>
+      <p:sp>
+        <p:nvSpPr>
+          <p:cNvPr id="12" name="TextBox 11">
+            <a:extLst>
+              <a:ext uri="{FF2B5EF4-FFF2-40B4-BE49-F238E27FC236}">
+                <a16:creationId xmlns:a16="http://schemas.microsoft.com/office/drawing/2014/main" id="{CB23F714-2B86-3AC6-6E14-63B6A666DE94}"/>
+              </a:ext>
+            </a:extLst>
+          </p:cNvPr>
+          <p:cNvSpPr txBox="1"/>
+          <p:nvPr/>
+        </p:nvSpPr>
+        <p:spPr>
+          <a:xfrm>
+            <a:off x="7138737" y="1811937"/>
+            <a:ext cx="4820653" cy="830997"/>
+          </a:xfrm>
+          <a:prstGeom prst="rect">
+            <a:avLst/>
+          </a:prstGeom>
+          <a:noFill/>
+        </p:spPr>
+        <p:txBody>
+          <a:bodyPr wrap="square" rtlCol="0">
+            <a:spAutoFit/>
+          </a:bodyPr>
+          <a:lstStyle/>
+          <a:p>
+            <a:r>
+              <a:rPr lang="en-US" sz="1600" i="1" dirty="0"/>
+              <a:t>“I wonder if Burger King wants to sell me a sense of pride and accomplishment by making me work 10 hours for my f**king fries."</a:t>
+            </a:r>
+          </a:p>
+        </p:txBody>
+      </p:sp>
+      <p:cxnSp>
+        <p:nvCxnSpPr>
+          <p:cNvPr id="16" name="Straight Arrow Connector 15">
+            <a:extLst>
+              <a:ext uri="{FF2B5EF4-FFF2-40B4-BE49-F238E27FC236}">
+                <a16:creationId xmlns:a16="http://schemas.microsoft.com/office/drawing/2014/main" id="{C342BB06-1553-C9FB-FD08-998DC5891198}"/>
+              </a:ext>
+            </a:extLst>
+          </p:cNvPr>
+          <p:cNvCxnSpPr>
+            <a:cxnSpLocks/>
+            <a:stCxn id="12" idx="2"/>
+            <a:endCxn id="2" idx="1"/>
+          </p:cNvCxnSpPr>
+          <p:nvPr/>
+        </p:nvCxnSpPr>
+        <p:spPr>
+          <a:xfrm>
+            <a:off x="9549064" y="2642934"/>
+            <a:ext cx="1019792" cy="628069"/>
+          </a:xfrm>
+          <a:prstGeom prst="straightConnector1">
+            <a:avLst/>
+          </a:prstGeom>
+          <a:ln>
+            <a:tailEnd type="triangle"/>
+          </a:ln>
+        </p:spPr>
+        <p:style>
+          <a:lnRef idx="1">
+            <a:schemeClr val="dk1"/>
+          </a:lnRef>
+          <a:fillRef idx="0">
+            <a:schemeClr val="dk1"/>
+          </a:fillRef>
+          <a:effectRef idx="0">
+            <a:schemeClr val="dk1"/>
+          </a:effectRef>
+          <a:fontRef idx="minor">
+            <a:schemeClr val="tx1"/>
+          </a:fontRef>
+        </p:style>
+      </p:cxnSp>
+    </p:spTree>
+    <p:extLst>
+      <p:ext uri="{BB962C8B-B14F-4D97-AF65-F5344CB8AC3E}">
+        <p14:creationId xmlns:p14="http://schemas.microsoft.com/office/powerpoint/2010/main" val="3618969287"/>
+      </p:ext>
+    </p:extLst>
+  </p:cSld>
+  <p:clrMapOvr>
+    <a:masterClrMapping/>
+  </p:clrMapOvr>
+</p:sld>
+</file>
+
+<file path=ppt/slides/slide21.xml><?xml version="1.0" encoding="utf-8"?>
+<p:sld xmlns:a="http://schemas.openxmlformats.org/drawingml/2006/main" xmlns:r="http://schemas.openxmlformats.org/officeDocument/2006/relationships" xmlns:p="http://schemas.openxmlformats.org/presentationml/2006/main">
+  <p:cSld>
+    <p:spTree>
+      <p:nvGrpSpPr>
+        <p:cNvPr id="1" name=""/>
+        <p:cNvGrpSpPr/>
+        <p:nvPr/>
+      </p:nvGrpSpPr>
+      <p:grpSpPr>
+        <a:xfrm>
+          <a:off x="0" y="0"/>
+          <a:ext cx="0" cy="0"/>
+          <a:chOff x="0" y="0"/>
+          <a:chExt cx="0" cy="0"/>
+        </a:xfrm>
+      </p:grpSpPr>
+      <p:sp>
+        <p:nvSpPr>
+          <p:cNvPr id="2" name="Title 1">
+            <a:extLst>
+              <a:ext uri="{FF2B5EF4-FFF2-40B4-BE49-F238E27FC236}">
+                <a16:creationId xmlns:a16="http://schemas.microsoft.com/office/drawing/2014/main" id="{6E02908C-7600-D719-BC41-7B1557AF5102}"/>
+              </a:ext>
+            </a:extLst>
+          </p:cNvPr>
+          <p:cNvSpPr>
+            <a:spLocks noGrp="1"/>
+          </p:cNvSpPr>
+          <p:nvPr>
+            <p:ph type="ctrTitle"/>
+          </p:nvPr>
+        </p:nvSpPr>
+        <p:spPr>
+          <a:xfrm>
+            <a:off x="6196263" y="2571235"/>
+            <a:ext cx="5775158" cy="1715531"/>
+          </a:xfrm>
+        </p:spPr>
+        <p:txBody>
+          <a:bodyPr/>
+          <a:lstStyle/>
+          <a:p>
+            <a:r>
+              <a:rPr lang="en-US" b="1" dirty="0"/>
+              <a:t>Phase 2: </a:t>
+            </a:r>
+            <a:r>
+              <a:rPr lang="en-US" dirty="0"/>
+              <a:t>Wider Search</a:t>
+            </a:r>
+          </a:p>
+        </p:txBody>
+      </p:sp>
+      <p:sp>
+        <p:nvSpPr>
+          <p:cNvPr id="3" name="TextBox 2">
+            <a:extLst>
+              <a:ext uri="{FF2B5EF4-FFF2-40B4-BE49-F238E27FC236}">
+                <a16:creationId xmlns:a16="http://schemas.microsoft.com/office/drawing/2014/main" id="{8B4AB60B-B8CA-98EA-5CDC-58D290896BDE}"/>
+              </a:ext>
+            </a:extLst>
+          </p:cNvPr>
+          <p:cNvSpPr txBox="1"/>
+          <p:nvPr/>
+        </p:nvSpPr>
+        <p:spPr>
+          <a:xfrm>
+            <a:off x="6196263" y="3717758"/>
+            <a:ext cx="4762201" cy="461665"/>
+          </a:xfrm>
+          <a:prstGeom prst="rect">
+            <a:avLst/>
+          </a:prstGeom>
+          <a:noFill/>
+        </p:spPr>
+        <p:txBody>
+          <a:bodyPr wrap="none" rtlCol="0">
+            <a:spAutoFit/>
+          </a:bodyPr>
+          <a:lstStyle/>
+          <a:p>
+            <a:r>
+              <a:rPr lang="en-US" sz="2400" i="1" dirty="0">
+                <a:solidFill>
+                  <a:schemeClr val="bg1"/>
+                </a:solidFill>
+              </a:rPr>
+              <a:t>Model Cross-Topic Generalizability</a:t>
+            </a:r>
+          </a:p>
+        </p:txBody>
+      </p:sp>
+    </p:spTree>
+    <p:extLst>
+      <p:ext uri="{BB962C8B-B14F-4D97-AF65-F5344CB8AC3E}">
+        <p14:creationId xmlns:p14="http://schemas.microsoft.com/office/powerpoint/2010/main" val="1011657797"/>
+      </p:ext>
+    </p:extLst>
+  </p:cSld>
+  <p:clrMapOvr>
+    <a:masterClrMapping/>
+  </p:clrMapOvr>
+</p:sld>
+</file>
+
+<file path=ppt/slides/slide22.xml><?xml version="1.0" encoding="utf-8"?>
+<p:sld xmlns:a="http://schemas.openxmlformats.org/drawingml/2006/main" xmlns:r="http://schemas.openxmlformats.org/officeDocument/2006/relationships" xmlns:p="http://schemas.openxmlformats.org/presentationml/2006/main">
+  <p:cSld>
+    <p:spTree>
+      <p:nvGrpSpPr>
+        <p:cNvPr id="1" name=""/>
+        <p:cNvGrpSpPr/>
+        <p:nvPr/>
+      </p:nvGrpSpPr>
+      <p:grpSpPr>
+        <a:xfrm>
+          <a:off x="0" y="0"/>
+          <a:ext cx="0" cy="0"/>
+          <a:chOff x="0" y="0"/>
+          <a:chExt cx="0" cy="0"/>
+        </a:xfrm>
+      </p:grpSpPr>
+      <p:sp>
+        <p:nvSpPr>
+          <p:cNvPr id="2" name="Title 1">
+            <a:extLst>
+              <a:ext uri="{FF2B5EF4-FFF2-40B4-BE49-F238E27FC236}">
+                <a16:creationId xmlns:a16="http://schemas.microsoft.com/office/drawing/2014/main" id="{AC4D5766-8083-3764-3786-D8085BA87C6F}"/>
+              </a:ext>
+            </a:extLst>
+          </p:cNvPr>
+          <p:cNvSpPr>
+            <a:spLocks noGrp="1"/>
+          </p:cNvSpPr>
+          <p:nvPr>
+            <p:ph type="title"/>
+          </p:nvPr>
+        </p:nvSpPr>
+        <p:spPr/>
+        <p:txBody>
+          <a:bodyPr/>
+          <a:lstStyle/>
+          <a:p>
+            <a:r>
+              <a:rPr lang="en-US" dirty="0"/>
+              <a:t>Selecting Other Threads</a:t>
+            </a:r>
+          </a:p>
+        </p:txBody>
+      </p:sp>
+      <p:sp>
+        <p:nvSpPr>
+          <p:cNvPr id="7" name="Date Placeholder 6">
+            <a:extLst>
+              <a:ext uri="{FF2B5EF4-FFF2-40B4-BE49-F238E27FC236}">
+                <a16:creationId xmlns:a16="http://schemas.microsoft.com/office/drawing/2014/main" id="{91FFD205-2D7F-7F15-797D-8D3423063D53}"/>
+              </a:ext>
+            </a:extLst>
+          </p:cNvPr>
+          <p:cNvSpPr>
+            <a:spLocks noGrp="1"/>
+          </p:cNvSpPr>
+          <p:nvPr>
+            <p:ph type="dt" sz="half" idx="10"/>
+          </p:nvPr>
+        </p:nvSpPr>
+        <p:spPr/>
+        <p:txBody>
+          <a:bodyPr/>
+          <a:lstStyle/>
+          <a:p>
+            <a:r>
+              <a:rPr lang="en-US"/>
+              <a:t>Spring 2022</a:t>
+            </a:r>
+            <a:endParaRPr lang="en-US" dirty="0"/>
+          </a:p>
+        </p:txBody>
+      </p:sp>
+      <p:sp>
+        <p:nvSpPr>
+          <p:cNvPr id="8" name="Footer Placeholder 7">
+            <a:extLst>
+              <a:ext uri="{FF2B5EF4-FFF2-40B4-BE49-F238E27FC236}">
+                <a16:creationId xmlns:a16="http://schemas.microsoft.com/office/drawing/2014/main" id="{1EF1E878-67C1-7BA0-FD25-20682B0ADC39}"/>
+              </a:ext>
+            </a:extLst>
+          </p:cNvPr>
+          <p:cNvSpPr>
+            <a:spLocks noGrp="1"/>
+          </p:cNvSpPr>
+          <p:nvPr>
+            <p:ph type="ftr" sz="quarter" idx="11"/>
+          </p:nvPr>
+        </p:nvSpPr>
+        <p:spPr/>
+        <p:txBody>
+          <a:bodyPr/>
+          <a:lstStyle/>
+          <a:p>
+            <a:r>
+              <a:rPr lang="en-US"/>
+              <a:t>Data Wrangling - Final Project</a:t>
+            </a:r>
+            <a:endParaRPr lang="en-US" dirty="0"/>
+          </a:p>
+        </p:txBody>
+      </p:sp>
+      <p:sp>
+        <p:nvSpPr>
+          <p:cNvPr id="9" name="Slide Number Placeholder 8">
+            <a:extLst>
+              <a:ext uri="{FF2B5EF4-FFF2-40B4-BE49-F238E27FC236}">
+                <a16:creationId xmlns:a16="http://schemas.microsoft.com/office/drawing/2014/main" id="{E727E30A-57C0-1412-6648-236A0BCF8DFF}"/>
+              </a:ext>
+            </a:extLst>
+          </p:cNvPr>
+          <p:cNvSpPr>
+            <a:spLocks noGrp="1"/>
+          </p:cNvSpPr>
+          <p:nvPr>
+            <p:ph type="sldNum" sz="quarter" idx="12"/>
+          </p:nvPr>
+        </p:nvSpPr>
+        <p:spPr/>
+        <p:txBody>
+          <a:bodyPr/>
+          <a:lstStyle/>
+          <a:p>
+            <a:fld id="{B5CEABB6-07DC-46E8-9B57-56EC44A396E5}" type="slidenum">
+              <a:rPr lang="en-US" smtClean="0"/>
+              <a:t>22</a:t>
+            </a:fld>
+            <a:endParaRPr lang="en-US" dirty="0"/>
+          </a:p>
+        </p:txBody>
+      </p:sp>
+      <p:pic>
+        <p:nvPicPr>
+          <p:cNvPr id="20" name="Picture 19">
+            <a:extLst>
+              <a:ext uri="{FF2B5EF4-FFF2-40B4-BE49-F238E27FC236}">
+                <a16:creationId xmlns:a16="http://schemas.microsoft.com/office/drawing/2014/main" id="{0CCCD4C2-2E28-9AE7-9BBA-E07031691389}"/>
+              </a:ext>
+            </a:extLst>
+          </p:cNvPr>
+          <p:cNvPicPr>
+            <a:picLocks noChangeAspect="1"/>
+          </p:cNvPicPr>
+          <p:nvPr/>
+        </p:nvPicPr>
+        <p:blipFill>
+          <a:blip r:embed="rId2"/>
+          <a:stretch>
+            <a:fillRect/>
+          </a:stretch>
+        </p:blipFill>
+        <p:spPr>
+          <a:xfrm>
+            <a:off x="8008584" y="673769"/>
+            <a:ext cx="3576489" cy="1416050"/>
+          </a:xfrm>
+          <a:prstGeom prst="rect">
+            <a:avLst/>
+          </a:prstGeom>
+        </p:spPr>
+      </p:pic>
+      <p:pic>
+        <p:nvPicPr>
+          <p:cNvPr id="24" name="Graphic 23" descr="Rating Star with solid fill">
+            <a:extLst>
+              <a:ext uri="{FF2B5EF4-FFF2-40B4-BE49-F238E27FC236}">
+                <a16:creationId xmlns:a16="http://schemas.microsoft.com/office/drawing/2014/main" id="{765CDB61-5E66-EC12-EF07-1E8E6EAC3607}"/>
+              </a:ext>
+            </a:extLst>
+          </p:cNvPr>
+          <p:cNvPicPr>
+            <a:picLocks noChangeAspect="1"/>
+          </p:cNvPicPr>
+          <p:nvPr/>
+        </p:nvPicPr>
+        <p:blipFill>
+          <a:blip r:embed="rId3">
+            <a:extLst>
+              <a:ext uri="{96DAC541-7B7A-43D3-8B79-37D633B846F1}">
+                <asvg:svgBlip xmlns:asvg="http://schemas.microsoft.com/office/drawing/2016/SVG/main" r:embed="rId4"/>
+              </a:ext>
+            </a:extLst>
+          </a:blip>
+          <a:stretch>
+            <a:fillRect/>
+          </a:stretch>
+        </p:blipFill>
+        <p:spPr>
+          <a:xfrm rot="16200000">
+            <a:off x="8008584" y="860953"/>
+            <a:ext cx="914400" cy="914400"/>
+          </a:xfrm>
+          <a:prstGeom prst="rect">
+            <a:avLst/>
+          </a:prstGeom>
+        </p:spPr>
+      </p:pic>
+      <p:sp>
+        <p:nvSpPr>
+          <p:cNvPr id="25" name="TextBox 24">
+            <a:extLst>
+              <a:ext uri="{FF2B5EF4-FFF2-40B4-BE49-F238E27FC236}">
+                <a16:creationId xmlns:a16="http://schemas.microsoft.com/office/drawing/2014/main" id="{AFCC3197-8B56-C433-1C08-25121840B51A}"/>
+              </a:ext>
+            </a:extLst>
+          </p:cNvPr>
+          <p:cNvSpPr txBox="1"/>
+          <p:nvPr/>
+        </p:nvSpPr>
+        <p:spPr>
+          <a:xfrm>
+            <a:off x="838200" y="1775353"/>
+            <a:ext cx="4912692" cy="1077218"/>
+          </a:xfrm>
+          <a:prstGeom prst="rect">
+            <a:avLst/>
+          </a:prstGeom>
+          <a:noFill/>
+        </p:spPr>
+        <p:txBody>
+          <a:bodyPr wrap="none" rtlCol="0">
+            <a:spAutoFit/>
+          </a:bodyPr>
+          <a:lstStyle/>
+          <a:p>
+            <a:r>
+              <a:rPr lang="en-US" sz="1600" dirty="0"/>
+              <a:t>Topics Selected Using Implications from Case Study:</a:t>
+            </a:r>
+          </a:p>
+          <a:p>
+            <a:pPr marL="285750" indent="-285750">
+              <a:buFont typeface="Arial" panose="020B0604020202020204" pitchFamily="34" charset="0"/>
+              <a:buChar char="•"/>
+            </a:pPr>
+            <a:r>
+              <a:rPr lang="en-US" sz="1600" dirty="0"/>
+              <a:t>Looking for longer posts, more ‘charged’ language</a:t>
+            </a:r>
+          </a:p>
+          <a:p>
+            <a:pPr marL="285750" indent="-285750">
+              <a:buFont typeface="Arial" panose="020B0604020202020204" pitchFamily="34" charset="0"/>
+              <a:buChar char="•"/>
+            </a:pPr>
+            <a:r>
+              <a:rPr lang="en-US" sz="1600" dirty="0"/>
+              <a:t>Looking for fewer instances of sarcasm</a:t>
+            </a:r>
+          </a:p>
+          <a:p>
+            <a:pPr marL="285750" indent="-285750">
+              <a:buFont typeface="Arial" panose="020B0604020202020204" pitchFamily="34" charset="0"/>
+              <a:buChar char="•"/>
+            </a:pPr>
+            <a:r>
+              <a:rPr lang="en-US" sz="1600" dirty="0"/>
+              <a:t>More mix of up and down votes</a:t>
+            </a:r>
+          </a:p>
+        </p:txBody>
+      </p:sp>
+      <p:sp>
+        <p:nvSpPr>
+          <p:cNvPr id="28" name="TextBox 27">
+            <a:extLst>
+              <a:ext uri="{FF2B5EF4-FFF2-40B4-BE49-F238E27FC236}">
+                <a16:creationId xmlns:a16="http://schemas.microsoft.com/office/drawing/2014/main" id="{27FE5F9D-E63E-4A85-268D-07384212A33E}"/>
+              </a:ext>
+            </a:extLst>
+          </p:cNvPr>
+          <p:cNvSpPr txBox="1"/>
+          <p:nvPr/>
+        </p:nvSpPr>
+        <p:spPr>
+          <a:xfrm>
+            <a:off x="2273968" y="4499811"/>
+            <a:ext cx="1768689" cy="369332"/>
+          </a:xfrm>
+          <a:prstGeom prst="rect">
+            <a:avLst/>
+          </a:prstGeom>
+          <a:noFill/>
+        </p:spPr>
+        <p:txBody>
+          <a:bodyPr wrap="none" rtlCol="0">
+            <a:spAutoFit/>
+          </a:bodyPr>
+          <a:lstStyle/>
+          <a:p>
+            <a:r>
+              <a:rPr lang="en-US" dirty="0"/>
+              <a:t>Climate Change</a:t>
+            </a:r>
+          </a:p>
+        </p:txBody>
+      </p:sp>
+      <p:sp>
+        <p:nvSpPr>
+          <p:cNvPr id="29" name="TextBox 28">
+            <a:extLst>
+              <a:ext uri="{FF2B5EF4-FFF2-40B4-BE49-F238E27FC236}">
+                <a16:creationId xmlns:a16="http://schemas.microsoft.com/office/drawing/2014/main" id="{33CD0B8A-908A-90DA-20B3-DA48DF917495}"/>
+              </a:ext>
+            </a:extLst>
+          </p:cNvPr>
+          <p:cNvSpPr txBox="1"/>
+          <p:nvPr/>
+        </p:nvSpPr>
+        <p:spPr>
+          <a:xfrm>
+            <a:off x="5647768" y="4235128"/>
+            <a:ext cx="896464" cy="369332"/>
+          </a:xfrm>
+          <a:prstGeom prst="rect">
+            <a:avLst/>
+          </a:prstGeom>
+          <a:noFill/>
+        </p:spPr>
+        <p:txBody>
+          <a:bodyPr wrap="none" rtlCol="0">
+            <a:spAutoFit/>
+          </a:bodyPr>
+          <a:lstStyle/>
+          <a:p>
+            <a:r>
+              <a:rPr lang="en-US" dirty="0"/>
+              <a:t>Politics</a:t>
+            </a:r>
+          </a:p>
+        </p:txBody>
+      </p:sp>
+      <p:sp>
+        <p:nvSpPr>
+          <p:cNvPr id="30" name="TextBox 29">
+            <a:extLst>
+              <a:ext uri="{FF2B5EF4-FFF2-40B4-BE49-F238E27FC236}">
+                <a16:creationId xmlns:a16="http://schemas.microsoft.com/office/drawing/2014/main" id="{5EDD4946-03A0-56AF-5A03-57F3D6AE2555}"/>
+              </a:ext>
+            </a:extLst>
+          </p:cNvPr>
+          <p:cNvSpPr txBox="1"/>
+          <p:nvPr/>
+        </p:nvSpPr>
+        <p:spPr>
+          <a:xfrm>
+            <a:off x="4038600" y="3558714"/>
+            <a:ext cx="2168927" cy="369332"/>
+          </a:xfrm>
+          <a:prstGeom prst="rect">
+            <a:avLst/>
+          </a:prstGeom>
+          <a:noFill/>
+        </p:spPr>
+        <p:txBody>
+          <a:bodyPr wrap="none" rtlCol="0">
+            <a:spAutoFit/>
+          </a:bodyPr>
+          <a:lstStyle/>
+          <a:p>
+            <a:r>
+              <a:rPr lang="en-US" dirty="0"/>
+              <a:t>Reproductive Rights</a:t>
+            </a:r>
+          </a:p>
+        </p:txBody>
+      </p:sp>
+    </p:spTree>
+    <p:extLst>
+      <p:ext uri="{BB962C8B-B14F-4D97-AF65-F5344CB8AC3E}">
+        <p14:creationId xmlns:p14="http://schemas.microsoft.com/office/powerpoint/2010/main" val="2249092515"/>
+      </p:ext>
+    </p:extLst>
+  </p:cSld>
+  <p:clrMapOvr>
+    <a:masterClrMapping/>
+  </p:clrMapOvr>
+</p:sld>
+</file>
+
+<file path=ppt/slides/slide23.xml><?xml version="1.0" encoding="utf-8"?>
+<p:sld xmlns:a="http://schemas.openxmlformats.org/drawingml/2006/main" xmlns:r="http://schemas.openxmlformats.org/officeDocument/2006/relationships" xmlns:p="http://schemas.openxmlformats.org/presentationml/2006/main">
+  <p:cSld>
+    <p:spTree>
+      <p:nvGrpSpPr>
+        <p:cNvPr id="1" name=""/>
+        <p:cNvGrpSpPr/>
+        <p:nvPr/>
+      </p:nvGrpSpPr>
+      <p:grpSpPr>
+        <a:xfrm>
+          <a:off x="0" y="0"/>
+          <a:ext cx="0" cy="0"/>
+          <a:chOff x="0" y="0"/>
+          <a:chExt cx="0" cy="0"/>
+        </a:xfrm>
+      </p:grpSpPr>
+      <p:sp>
+        <p:nvSpPr>
+          <p:cNvPr id="2" name="Title 1">
+            <a:extLst>
+              <a:ext uri="{FF2B5EF4-FFF2-40B4-BE49-F238E27FC236}">
+                <a16:creationId xmlns:a16="http://schemas.microsoft.com/office/drawing/2014/main" id="{CA297FDD-0A7C-9272-4663-6642A0D614EA}"/>
+              </a:ext>
+            </a:extLst>
+          </p:cNvPr>
+          <p:cNvSpPr>
+            <a:spLocks noGrp="1"/>
+          </p:cNvSpPr>
+          <p:nvPr>
+            <p:ph type="title"/>
+          </p:nvPr>
+        </p:nvSpPr>
+        <p:spPr/>
+        <p:txBody>
+          <a:bodyPr/>
+          <a:lstStyle/>
+          <a:p>
+            <a:r>
+              <a:rPr lang="en-US" dirty="0"/>
+              <a:t>Climate Change</a:t>
+            </a:r>
+          </a:p>
+        </p:txBody>
+      </p:sp>
+      <p:sp>
+        <p:nvSpPr>
+          <p:cNvPr id="4" name="Date Placeholder 3">
+            <a:extLst>
+              <a:ext uri="{FF2B5EF4-FFF2-40B4-BE49-F238E27FC236}">
+                <a16:creationId xmlns:a16="http://schemas.microsoft.com/office/drawing/2014/main" id="{867C97C6-DB6D-E335-E688-84E26E913FD9}"/>
+              </a:ext>
+            </a:extLst>
+          </p:cNvPr>
+          <p:cNvSpPr>
+            <a:spLocks noGrp="1"/>
+          </p:cNvSpPr>
+          <p:nvPr>
+            <p:ph type="dt" sz="half" idx="10"/>
+          </p:nvPr>
+        </p:nvSpPr>
+        <p:spPr/>
+        <p:txBody>
+          <a:bodyPr/>
+          <a:lstStyle/>
+          <a:p>
+            <a:r>
+              <a:rPr lang="en-US"/>
+              <a:t>Spring 2022</a:t>
+            </a:r>
+            <a:endParaRPr lang="en-US" dirty="0"/>
+          </a:p>
+        </p:txBody>
+      </p:sp>
+      <p:sp>
+        <p:nvSpPr>
+          <p:cNvPr id="5" name="Footer Placeholder 4">
+            <a:extLst>
+              <a:ext uri="{FF2B5EF4-FFF2-40B4-BE49-F238E27FC236}">
+                <a16:creationId xmlns:a16="http://schemas.microsoft.com/office/drawing/2014/main" id="{A29CECBA-3ED8-56F5-7817-8A100EC5B538}"/>
+              </a:ext>
+            </a:extLst>
+          </p:cNvPr>
+          <p:cNvSpPr>
+            <a:spLocks noGrp="1"/>
+          </p:cNvSpPr>
+          <p:nvPr>
+            <p:ph type="ftr" sz="quarter" idx="11"/>
+          </p:nvPr>
+        </p:nvSpPr>
+        <p:spPr/>
+        <p:txBody>
+          <a:bodyPr/>
+          <a:lstStyle/>
+          <a:p>
+            <a:r>
+              <a:rPr lang="en-US"/>
+              <a:t>Data Wrangling - Final Project</a:t>
+            </a:r>
+            <a:endParaRPr lang="en-US" dirty="0"/>
+          </a:p>
+        </p:txBody>
+      </p:sp>
+      <p:sp>
+        <p:nvSpPr>
+          <p:cNvPr id="6" name="Slide Number Placeholder 5">
+            <a:extLst>
+              <a:ext uri="{FF2B5EF4-FFF2-40B4-BE49-F238E27FC236}">
+                <a16:creationId xmlns:a16="http://schemas.microsoft.com/office/drawing/2014/main" id="{2D0B5BE1-C120-E52F-46D7-1166247EAD90}"/>
+              </a:ext>
+            </a:extLst>
+          </p:cNvPr>
+          <p:cNvSpPr>
+            <a:spLocks noGrp="1"/>
+          </p:cNvSpPr>
+          <p:nvPr>
+            <p:ph type="sldNum" sz="quarter" idx="12"/>
+          </p:nvPr>
+        </p:nvSpPr>
+        <p:spPr/>
+        <p:txBody>
+          <a:bodyPr/>
+          <a:lstStyle/>
+          <a:p>
+            <a:fld id="{B5CEABB6-07DC-46E8-9B57-56EC44A396E5}" type="slidenum">
+              <a:rPr lang="en-US" smtClean="0"/>
+              <a:t>23</a:t>
+            </a:fld>
+            <a:endParaRPr lang="en-US" dirty="0"/>
+          </a:p>
+        </p:txBody>
+      </p:sp>
+      <p:pic>
+        <p:nvPicPr>
+          <p:cNvPr id="7" name="Picture 6">
+            <a:extLst>
+              <a:ext uri="{FF2B5EF4-FFF2-40B4-BE49-F238E27FC236}">
+                <a16:creationId xmlns:a16="http://schemas.microsoft.com/office/drawing/2014/main" id="{D688C450-6C46-0BE7-C438-E5F0A4A2D296}"/>
+              </a:ext>
+            </a:extLst>
+          </p:cNvPr>
+          <p:cNvPicPr>
+            <a:picLocks noChangeAspect="1"/>
+          </p:cNvPicPr>
+          <p:nvPr/>
+        </p:nvPicPr>
+        <p:blipFill>
+          <a:blip r:embed="rId2"/>
+          <a:stretch>
+            <a:fillRect/>
+          </a:stretch>
+        </p:blipFill>
+        <p:spPr>
+          <a:xfrm>
+            <a:off x="3117850" y="2457450"/>
+            <a:ext cx="5956300" cy="1943100"/>
+          </a:xfrm>
+          <a:prstGeom prst="rect">
+            <a:avLst/>
+          </a:prstGeom>
+        </p:spPr>
+      </p:pic>
+    </p:spTree>
+    <p:extLst>
+      <p:ext uri="{BB962C8B-B14F-4D97-AF65-F5344CB8AC3E}">
+        <p14:creationId xmlns:p14="http://schemas.microsoft.com/office/powerpoint/2010/main" val="502711359"/>
+      </p:ext>
+    </p:extLst>
+  </p:cSld>
+  <p:clrMapOvr>
+    <a:masterClrMapping/>
+  </p:clrMapOvr>
+</p:sld>
+</file>
+
+<file path=ppt/slides/slide24.xml><?xml version="1.0" encoding="utf-8"?>
+<p:sld xmlns:a="http://schemas.openxmlformats.org/drawingml/2006/main" xmlns:r="http://schemas.openxmlformats.org/officeDocument/2006/relationships" xmlns:p="http://schemas.openxmlformats.org/presentationml/2006/main">
+  <p:cSld>
+    <p:spTree>
+      <p:nvGrpSpPr>
+        <p:cNvPr id="1" name=""/>
+        <p:cNvGrpSpPr/>
+        <p:nvPr/>
+      </p:nvGrpSpPr>
+      <p:grpSpPr>
+        <a:xfrm>
+          <a:off x="0" y="0"/>
+          <a:ext cx="0" cy="0"/>
+          <a:chOff x="0" y="0"/>
+          <a:chExt cx="0" cy="0"/>
+        </a:xfrm>
+      </p:grpSpPr>
+      <p:sp>
+        <p:nvSpPr>
+          <p:cNvPr id="2" name="Title 1">
+            <a:extLst>
+              <a:ext uri="{FF2B5EF4-FFF2-40B4-BE49-F238E27FC236}">
+                <a16:creationId xmlns:a16="http://schemas.microsoft.com/office/drawing/2014/main" id="{1A574430-7E5F-B64C-AFE8-52326092D4AB}"/>
+              </a:ext>
+            </a:extLst>
+          </p:cNvPr>
+          <p:cNvSpPr>
+            <a:spLocks noGrp="1"/>
+          </p:cNvSpPr>
+          <p:nvPr>
+            <p:ph type="title"/>
+          </p:nvPr>
+        </p:nvSpPr>
+        <p:spPr/>
+        <p:txBody>
+          <a:bodyPr/>
+          <a:lstStyle/>
+          <a:p>
+            <a:endParaRPr lang="en-US"/>
+          </a:p>
+        </p:txBody>
+      </p:sp>
+      <p:sp>
+        <p:nvSpPr>
+          <p:cNvPr id="3" name="SmartArt Placeholder 2">
+            <a:extLst>
+              <a:ext uri="{FF2B5EF4-FFF2-40B4-BE49-F238E27FC236}">
+                <a16:creationId xmlns:a16="http://schemas.microsoft.com/office/drawing/2014/main" id="{19FC8608-5C00-16F2-9D6F-EF5E8B1FE1E8}"/>
+              </a:ext>
+            </a:extLst>
+          </p:cNvPr>
+          <p:cNvSpPr>
+            <a:spLocks noGrp="1"/>
+          </p:cNvSpPr>
+          <p:nvPr>
+            <p:ph type="dgm" sz="quarter" idx="15"/>
+          </p:nvPr>
+        </p:nvSpPr>
+        <p:spPr/>
+      </p:sp>
+      <p:sp>
+        <p:nvSpPr>
+          <p:cNvPr id="4" name="Date Placeholder 3">
+            <a:extLst>
+              <a:ext uri="{FF2B5EF4-FFF2-40B4-BE49-F238E27FC236}">
+                <a16:creationId xmlns:a16="http://schemas.microsoft.com/office/drawing/2014/main" id="{7F6645BD-7E61-3FA1-175F-1029689EF68B}"/>
+              </a:ext>
+            </a:extLst>
+          </p:cNvPr>
+          <p:cNvSpPr>
+            <a:spLocks noGrp="1"/>
+          </p:cNvSpPr>
+          <p:nvPr>
+            <p:ph type="dt" sz="half" idx="10"/>
+          </p:nvPr>
+        </p:nvSpPr>
+        <p:spPr/>
+        <p:txBody>
+          <a:bodyPr/>
+          <a:lstStyle/>
+          <a:p>
+            <a:r>
+              <a:rPr lang="en-US"/>
+              <a:t>Spring 2022</a:t>
+            </a:r>
+            <a:endParaRPr lang="en-US" dirty="0"/>
+          </a:p>
+        </p:txBody>
+      </p:sp>
+      <p:sp>
+        <p:nvSpPr>
+          <p:cNvPr id="5" name="Footer Placeholder 4">
+            <a:extLst>
+              <a:ext uri="{FF2B5EF4-FFF2-40B4-BE49-F238E27FC236}">
+                <a16:creationId xmlns:a16="http://schemas.microsoft.com/office/drawing/2014/main" id="{32FB3CD2-88ED-42CA-E081-22F185FDDBA1}"/>
+              </a:ext>
+            </a:extLst>
+          </p:cNvPr>
+          <p:cNvSpPr>
+            <a:spLocks noGrp="1"/>
+          </p:cNvSpPr>
+          <p:nvPr>
+            <p:ph type="ftr" sz="quarter" idx="11"/>
+          </p:nvPr>
+        </p:nvSpPr>
+        <p:spPr/>
+        <p:txBody>
+          <a:bodyPr/>
+          <a:lstStyle/>
+          <a:p>
+            <a:r>
+              <a:rPr lang="en-US"/>
+              <a:t>Data Wrangling - Final Project</a:t>
+            </a:r>
+            <a:endParaRPr lang="en-US" dirty="0"/>
+          </a:p>
+        </p:txBody>
+      </p:sp>
+      <p:sp>
+        <p:nvSpPr>
+          <p:cNvPr id="6" name="Slide Number Placeholder 5">
+            <a:extLst>
+              <a:ext uri="{FF2B5EF4-FFF2-40B4-BE49-F238E27FC236}">
+                <a16:creationId xmlns:a16="http://schemas.microsoft.com/office/drawing/2014/main" id="{17CFD2D2-EB35-EEC8-2B80-888115224F02}"/>
+              </a:ext>
+            </a:extLst>
+          </p:cNvPr>
+          <p:cNvSpPr>
+            <a:spLocks noGrp="1"/>
+          </p:cNvSpPr>
+          <p:nvPr>
+            <p:ph type="sldNum" sz="quarter" idx="12"/>
+          </p:nvPr>
+        </p:nvSpPr>
+        <p:spPr/>
+        <p:txBody>
+          <a:bodyPr/>
+          <a:lstStyle/>
+          <a:p>
+            <a:fld id="{B5CEABB6-07DC-46E8-9B57-56EC44A396E5}" type="slidenum">
+              <a:rPr lang="en-US" smtClean="0"/>
+              <a:t>24</a:t>
+            </a:fld>
+            <a:endParaRPr lang="en-US" dirty="0"/>
+          </a:p>
+        </p:txBody>
+      </p:sp>
+    </p:spTree>
+    <p:extLst>
+      <p:ext uri="{BB962C8B-B14F-4D97-AF65-F5344CB8AC3E}">
+        <p14:creationId xmlns:p14="http://schemas.microsoft.com/office/powerpoint/2010/main" val="3790985681"/>
+      </p:ext>
+    </p:extLst>
+  </p:cSld>
+  <p:clrMapOvr>
+    <a:masterClrMapping/>
+  </p:clrMapOvr>
+</p:sld>
+</file>
+
+<file path=ppt/slides/slide25.xml><?xml version="1.0" encoding="utf-8"?>
+<p:sld xmlns:a="http://schemas.openxmlformats.org/drawingml/2006/main" xmlns:r="http://schemas.openxmlformats.org/officeDocument/2006/relationships" xmlns:p="http://schemas.openxmlformats.org/presentationml/2006/main">
+  <p:cSld>
+    <p:spTree>
+      <p:nvGrpSpPr>
+        <p:cNvPr id="1" name=""/>
+        <p:cNvGrpSpPr/>
+        <p:nvPr/>
+      </p:nvGrpSpPr>
+      <p:grpSpPr>
+        <a:xfrm>
+          <a:off x="0" y="0"/>
+          <a:ext cx="0" cy="0"/>
+          <a:chOff x="0" y="0"/>
+          <a:chExt cx="0" cy="0"/>
+        </a:xfrm>
+      </p:grpSpPr>
+      <p:sp>
+        <p:nvSpPr>
+          <p:cNvPr id="2" name="Title 1">
+            <a:extLst>
+              <a:ext uri="{FF2B5EF4-FFF2-40B4-BE49-F238E27FC236}">
+                <a16:creationId xmlns:a16="http://schemas.microsoft.com/office/drawing/2014/main" id="{44CD7060-F72A-E7E0-BDD7-567CE8AA8ADD}"/>
+              </a:ext>
+            </a:extLst>
+          </p:cNvPr>
+          <p:cNvSpPr>
+            <a:spLocks noGrp="1"/>
+          </p:cNvSpPr>
+          <p:nvPr>
+            <p:ph type="title"/>
+          </p:nvPr>
+        </p:nvSpPr>
+        <p:spPr/>
+        <p:txBody>
+          <a:bodyPr/>
+          <a:lstStyle/>
+          <a:p>
+            <a:endParaRPr lang="en-US"/>
+          </a:p>
+        </p:txBody>
+      </p:sp>
+      <p:sp>
+        <p:nvSpPr>
+          <p:cNvPr id="3" name="SmartArt Placeholder 2">
+            <a:extLst>
+              <a:ext uri="{FF2B5EF4-FFF2-40B4-BE49-F238E27FC236}">
+                <a16:creationId xmlns:a16="http://schemas.microsoft.com/office/drawing/2014/main" id="{B1D28B01-9474-F8DD-86A2-AC5BA71783E3}"/>
+              </a:ext>
+            </a:extLst>
+          </p:cNvPr>
+          <p:cNvSpPr>
+            <a:spLocks noGrp="1"/>
+          </p:cNvSpPr>
+          <p:nvPr>
+            <p:ph type="dgm" sz="quarter" idx="15"/>
+          </p:nvPr>
+        </p:nvSpPr>
+        <p:spPr/>
+      </p:sp>
+      <p:sp>
+        <p:nvSpPr>
+          <p:cNvPr id="4" name="Date Placeholder 3">
+            <a:extLst>
+              <a:ext uri="{FF2B5EF4-FFF2-40B4-BE49-F238E27FC236}">
+                <a16:creationId xmlns:a16="http://schemas.microsoft.com/office/drawing/2014/main" id="{8630F608-9611-A432-0A75-788B2D511458}"/>
+              </a:ext>
+            </a:extLst>
+          </p:cNvPr>
+          <p:cNvSpPr>
+            <a:spLocks noGrp="1"/>
+          </p:cNvSpPr>
+          <p:nvPr>
+            <p:ph type="dt" sz="half" idx="10"/>
+          </p:nvPr>
+        </p:nvSpPr>
+        <p:spPr/>
+        <p:txBody>
+          <a:bodyPr/>
+          <a:lstStyle/>
+          <a:p>
+            <a:r>
+              <a:rPr lang="en-US"/>
+              <a:t>Spring 2022</a:t>
+            </a:r>
+            <a:endParaRPr lang="en-US" dirty="0"/>
+          </a:p>
+        </p:txBody>
+      </p:sp>
+      <p:sp>
+        <p:nvSpPr>
+          <p:cNvPr id="5" name="Footer Placeholder 4">
+            <a:extLst>
+              <a:ext uri="{FF2B5EF4-FFF2-40B4-BE49-F238E27FC236}">
+                <a16:creationId xmlns:a16="http://schemas.microsoft.com/office/drawing/2014/main" id="{9F9154F7-367A-D0A8-0690-6BC02243B142}"/>
+              </a:ext>
+            </a:extLst>
+          </p:cNvPr>
+          <p:cNvSpPr>
+            <a:spLocks noGrp="1"/>
+          </p:cNvSpPr>
+          <p:nvPr>
+            <p:ph type="ftr" sz="quarter" idx="11"/>
+          </p:nvPr>
+        </p:nvSpPr>
+        <p:spPr/>
+        <p:txBody>
+          <a:bodyPr/>
+          <a:lstStyle/>
+          <a:p>
+            <a:r>
+              <a:rPr lang="en-US"/>
+              <a:t>Data Wrangling - Final Project</a:t>
+            </a:r>
+            <a:endParaRPr lang="en-US" dirty="0"/>
+          </a:p>
+        </p:txBody>
+      </p:sp>
+      <p:sp>
+        <p:nvSpPr>
+          <p:cNvPr id="6" name="Slide Number Placeholder 5">
+            <a:extLst>
+              <a:ext uri="{FF2B5EF4-FFF2-40B4-BE49-F238E27FC236}">
+                <a16:creationId xmlns:a16="http://schemas.microsoft.com/office/drawing/2014/main" id="{B75996D5-6964-79A4-39EB-AD81575B2995}"/>
+              </a:ext>
+            </a:extLst>
+          </p:cNvPr>
+          <p:cNvSpPr>
+            <a:spLocks noGrp="1"/>
+          </p:cNvSpPr>
+          <p:nvPr>
+            <p:ph type="sldNum" sz="quarter" idx="12"/>
+          </p:nvPr>
+        </p:nvSpPr>
+        <p:spPr/>
+        <p:txBody>
+          <a:bodyPr/>
+          <a:lstStyle/>
+          <a:p>
+            <a:fld id="{B5CEABB6-07DC-46E8-9B57-56EC44A396E5}" type="slidenum">
+              <a:rPr lang="en-US" smtClean="0"/>
+              <a:t>25</a:t>
+            </a:fld>
+            <a:endParaRPr lang="en-US" dirty="0"/>
+          </a:p>
+        </p:txBody>
+      </p:sp>
+    </p:spTree>
+    <p:extLst>
+      <p:ext uri="{BB962C8B-B14F-4D97-AF65-F5344CB8AC3E}">
+        <p14:creationId xmlns:p14="http://schemas.microsoft.com/office/powerpoint/2010/main" val="3522737189"/>
+      </p:ext>
+    </p:extLst>
+  </p:cSld>
+  <p:clrMapOvr>
+    <a:masterClrMapping/>
+  </p:clrMapOvr>
+</p:sld>
+</file>
+
+<file path=ppt/slides/slide26.xml><?xml version="1.0" encoding="utf-8"?>
+<p:sld xmlns:a="http://schemas.openxmlformats.org/drawingml/2006/main" xmlns:r="http://schemas.openxmlformats.org/officeDocument/2006/relationships" xmlns:p="http://schemas.openxmlformats.org/presentationml/2006/main">
+  <p:cSld>
+    <p:spTree>
+      <p:nvGrpSpPr>
+        <p:cNvPr id="1" name=""/>
+        <p:cNvGrpSpPr/>
+        <p:nvPr/>
+      </p:nvGrpSpPr>
+      <p:grpSpPr>
+        <a:xfrm>
+          <a:off x="0" y="0"/>
+          <a:ext cx="0" cy="0"/>
+          <a:chOff x="0" y="0"/>
+          <a:chExt cx="0" cy="0"/>
+        </a:xfrm>
+      </p:grpSpPr>
+      <p:sp>
+        <p:nvSpPr>
+          <p:cNvPr id="7" name="Title 6">
+            <a:extLst>
+              <a:ext uri="{FF2B5EF4-FFF2-40B4-BE49-F238E27FC236}">
+                <a16:creationId xmlns:a16="http://schemas.microsoft.com/office/drawing/2014/main" id="{7B0411F7-FC45-65D3-5D30-A405DC691D2F}"/>
+              </a:ext>
+            </a:extLst>
+          </p:cNvPr>
+          <p:cNvSpPr>
+            <a:spLocks noGrp="1"/>
+          </p:cNvSpPr>
+          <p:nvPr>
+            <p:ph type="title"/>
+          </p:nvPr>
+        </p:nvSpPr>
+        <p:spPr/>
+        <p:txBody>
+          <a:bodyPr/>
+          <a:lstStyle/>
+          <a:p>
+            <a:r>
+              <a:rPr lang="en-US" dirty="0"/>
+              <a:t>Comparison Across Topics</a:t>
+            </a:r>
+          </a:p>
+        </p:txBody>
+      </p:sp>
+      <p:graphicFrame>
+        <p:nvGraphicFramePr>
+          <p:cNvPr id="12" name="Table 12">
+            <a:extLst>
+              <a:ext uri="{FF2B5EF4-FFF2-40B4-BE49-F238E27FC236}">
+                <a16:creationId xmlns:a16="http://schemas.microsoft.com/office/drawing/2014/main" id="{2C31E46E-F55D-7B37-41BE-86203CD2B276}"/>
+              </a:ext>
+            </a:extLst>
+          </p:cNvPr>
+          <p:cNvGraphicFramePr>
+            <a:graphicFrameLocks noGrp="1"/>
+          </p:cNvGraphicFramePr>
+          <p:nvPr>
+            <p:ph sz="quarter" idx="15"/>
+            <p:extLst>
+              <p:ext uri="{D42A27DB-BD31-4B8C-83A1-F6EECF244321}">
+                <p14:modId xmlns:p14="http://schemas.microsoft.com/office/powerpoint/2010/main" val="2333406613"/>
+              </p:ext>
+            </p:extLst>
+          </p:nvPr>
+        </p:nvGraphicFramePr>
+        <p:xfrm>
+          <a:off x="4521995" y="2910999"/>
+          <a:ext cx="3148010" cy="741680"/>
+        </p:xfrm>
+        <a:graphic>
+          <a:graphicData uri="http://schemas.openxmlformats.org/drawingml/2006/table">
+            <a:tbl>
+              <a:tblPr firstRow="1" bandRow="1">
+                <a:tableStyleId>{5C22544A-7EE6-4342-B048-85BDC9FD1C3A}</a:tableStyleId>
+              </a:tblPr>
+              <a:tblGrid>
+                <a:gridCol w="629602">
+                  <a:extLst>
+                    <a:ext uri="{9D8B030D-6E8A-4147-A177-3AD203B41FA5}">
+                      <a16:colId xmlns:a16="http://schemas.microsoft.com/office/drawing/2014/main" val="2696822288"/>
+                    </a:ext>
+                  </a:extLst>
+                </a:gridCol>
+                <a:gridCol w="629602">
+                  <a:extLst>
+                    <a:ext uri="{9D8B030D-6E8A-4147-A177-3AD203B41FA5}">
+                      <a16:colId xmlns:a16="http://schemas.microsoft.com/office/drawing/2014/main" val="2321171821"/>
+                    </a:ext>
+                  </a:extLst>
+                </a:gridCol>
+                <a:gridCol w="629602">
+                  <a:extLst>
+                    <a:ext uri="{9D8B030D-6E8A-4147-A177-3AD203B41FA5}">
+                      <a16:colId xmlns:a16="http://schemas.microsoft.com/office/drawing/2014/main" val="1752220492"/>
+                    </a:ext>
+                  </a:extLst>
+                </a:gridCol>
+                <a:gridCol w="629602">
+                  <a:extLst>
+                    <a:ext uri="{9D8B030D-6E8A-4147-A177-3AD203B41FA5}">
+                      <a16:colId xmlns:a16="http://schemas.microsoft.com/office/drawing/2014/main" val="691335095"/>
+                    </a:ext>
+                  </a:extLst>
+                </a:gridCol>
+                <a:gridCol w="629602">
+                  <a:extLst>
+                    <a:ext uri="{9D8B030D-6E8A-4147-A177-3AD203B41FA5}">
+                      <a16:colId xmlns:a16="http://schemas.microsoft.com/office/drawing/2014/main" val="3472310086"/>
+                    </a:ext>
+                  </a:extLst>
+                </a:gridCol>
+              </a:tblGrid>
+              <a:tr h="370840">
+                <a:tc>
+                  <a:txBody>
+                    <a:bodyPr/>
+                    <a:lstStyle/>
+                    <a:p>
+                      <a:endParaRPr lang="en-US"/>
+                    </a:p>
+                  </a:txBody>
+                  <a:tcPr/>
+                </a:tc>
+                <a:tc>
+                  <a:txBody>
+                    <a:bodyPr/>
+                    <a:lstStyle/>
+                    <a:p>
+                      <a:endParaRPr lang="en-US"/>
+                    </a:p>
+                  </a:txBody>
+                  <a:tcPr/>
+                </a:tc>
+                <a:tc>
+                  <a:txBody>
+                    <a:bodyPr/>
+                    <a:lstStyle/>
+                    <a:p>
+                      <a:endParaRPr lang="en-US"/>
+                    </a:p>
+                  </a:txBody>
+                  <a:tcPr/>
+                </a:tc>
+                <a:tc>
+                  <a:txBody>
+                    <a:bodyPr/>
+                    <a:lstStyle/>
+                    <a:p>
+                      <a:endParaRPr lang="en-US"/>
+                    </a:p>
+                  </a:txBody>
+                  <a:tcPr/>
+                </a:tc>
+                <a:tc>
+                  <a:txBody>
+                    <a:bodyPr/>
+                    <a:lstStyle/>
+                    <a:p>
+                      <a:endParaRPr lang="en-US"/>
+                    </a:p>
+                  </a:txBody>
+                  <a:tcPr/>
+                </a:tc>
+                <a:extLst>
+                  <a:ext uri="{0D108BD9-81ED-4DB2-BD59-A6C34878D82A}">
+                    <a16:rowId xmlns:a16="http://schemas.microsoft.com/office/drawing/2014/main" val="580346135"/>
+                  </a:ext>
+                </a:extLst>
+              </a:tr>
+              <a:tr h="370840">
+                <a:tc>
+                  <a:txBody>
+                    <a:bodyPr/>
+                    <a:lstStyle/>
+                    <a:p>
+                      <a:endParaRPr lang="en-US" dirty="0"/>
+                    </a:p>
+                  </a:txBody>
+                  <a:tcPr/>
+                </a:tc>
+                <a:tc>
+                  <a:txBody>
+                    <a:bodyPr/>
+                    <a:lstStyle/>
+                    <a:p>
+                      <a:endParaRPr lang="en-US"/>
+                    </a:p>
+                  </a:txBody>
+                  <a:tcPr/>
+                </a:tc>
+                <a:tc>
+                  <a:txBody>
+                    <a:bodyPr/>
+                    <a:lstStyle/>
+                    <a:p>
+                      <a:endParaRPr lang="en-US"/>
+                    </a:p>
+                  </a:txBody>
+                  <a:tcPr/>
+                </a:tc>
+                <a:tc>
+                  <a:txBody>
+                    <a:bodyPr/>
+                    <a:lstStyle/>
+                    <a:p>
+                      <a:endParaRPr lang="en-US"/>
+                    </a:p>
+                  </a:txBody>
+                  <a:tcPr/>
+                </a:tc>
+                <a:tc>
+                  <a:txBody>
+                    <a:bodyPr/>
+                    <a:lstStyle/>
+                    <a:p>
+                      <a:endParaRPr lang="en-US" dirty="0"/>
+                    </a:p>
+                  </a:txBody>
+                  <a:tcPr/>
+                </a:tc>
+                <a:extLst>
+                  <a:ext uri="{0D108BD9-81ED-4DB2-BD59-A6C34878D82A}">
+                    <a16:rowId xmlns:a16="http://schemas.microsoft.com/office/drawing/2014/main" val="3847703534"/>
+                  </a:ext>
+                </a:extLst>
+              </a:tr>
+            </a:tbl>
+          </a:graphicData>
+        </a:graphic>
+      </p:graphicFrame>
+      <p:sp>
+        <p:nvSpPr>
+          <p:cNvPr id="4" name="Date Placeholder 3">
+            <a:extLst>
+              <a:ext uri="{FF2B5EF4-FFF2-40B4-BE49-F238E27FC236}">
+                <a16:creationId xmlns:a16="http://schemas.microsoft.com/office/drawing/2014/main" id="{9364E831-4B43-EC3F-06FE-0CC09BF1BD69}"/>
+              </a:ext>
+            </a:extLst>
+          </p:cNvPr>
+          <p:cNvSpPr>
+            <a:spLocks noGrp="1"/>
+          </p:cNvSpPr>
+          <p:nvPr>
+            <p:ph type="dt" sz="half" idx="10"/>
+          </p:nvPr>
+        </p:nvSpPr>
+        <p:spPr/>
+        <p:txBody>
+          <a:bodyPr/>
+          <a:lstStyle/>
+          <a:p>
+            <a:r>
+              <a:rPr lang="en-US"/>
+              <a:t>Spring 2022</a:t>
+            </a:r>
+            <a:endParaRPr lang="en-US" dirty="0"/>
+          </a:p>
+        </p:txBody>
+      </p:sp>
+      <p:sp>
+        <p:nvSpPr>
+          <p:cNvPr id="5" name="Footer Placeholder 4">
+            <a:extLst>
+              <a:ext uri="{FF2B5EF4-FFF2-40B4-BE49-F238E27FC236}">
+                <a16:creationId xmlns:a16="http://schemas.microsoft.com/office/drawing/2014/main" id="{245BDE0B-90E4-594B-4315-4E4163F39894}"/>
+              </a:ext>
+            </a:extLst>
+          </p:cNvPr>
+          <p:cNvSpPr>
+            <a:spLocks noGrp="1"/>
+          </p:cNvSpPr>
+          <p:nvPr>
+            <p:ph type="ftr" sz="quarter" idx="11"/>
+          </p:nvPr>
+        </p:nvSpPr>
+        <p:spPr/>
+        <p:txBody>
+          <a:bodyPr/>
+          <a:lstStyle/>
+          <a:p>
+            <a:r>
+              <a:rPr lang="en-US"/>
+              <a:t>Data Wrangling - Final Project</a:t>
+            </a:r>
+            <a:endParaRPr lang="en-US" dirty="0"/>
+          </a:p>
+        </p:txBody>
+      </p:sp>
+      <p:sp>
+        <p:nvSpPr>
+          <p:cNvPr id="6" name="Slide Number Placeholder 5">
+            <a:extLst>
+              <a:ext uri="{FF2B5EF4-FFF2-40B4-BE49-F238E27FC236}">
+                <a16:creationId xmlns:a16="http://schemas.microsoft.com/office/drawing/2014/main" id="{DD05EF0A-F292-150B-D14F-E69026A92B3E}"/>
+              </a:ext>
+            </a:extLst>
+          </p:cNvPr>
+          <p:cNvSpPr>
+            <a:spLocks noGrp="1"/>
+          </p:cNvSpPr>
+          <p:nvPr>
+            <p:ph type="sldNum" sz="quarter" idx="12"/>
+          </p:nvPr>
+        </p:nvSpPr>
+        <p:spPr/>
+        <p:txBody>
+          <a:bodyPr/>
+          <a:lstStyle/>
+          <a:p>
+            <a:fld id="{B5CEABB6-07DC-46E8-9B57-56EC44A396E5}" type="slidenum">
+              <a:rPr lang="en-US" smtClean="0"/>
+              <a:t>26</a:t>
+            </a:fld>
+            <a:endParaRPr lang="en-US" dirty="0"/>
+          </a:p>
+        </p:txBody>
+      </p:sp>
+    </p:spTree>
+    <p:extLst>
+      <p:ext uri="{BB962C8B-B14F-4D97-AF65-F5344CB8AC3E}">
+        <p14:creationId xmlns:p14="http://schemas.microsoft.com/office/powerpoint/2010/main" val="380048240"/>
       </p:ext>
     </p:extLst>
   </p:cSld>

</xml_diff>